<commit_message>
tests vs review code sample organization notes in slides
</commit_message>
<xml_diff>
--- a/slides/quality-slides.pptx
+++ b/slides/quality-slides.pptx
@@ -5,33 +5,34 @@
     <p:sldMasterId id="2147483780" r:id="rId1"/>
   </p:sldMasterIdLst>
   <p:notesMasterIdLst>
-    <p:notesMasterId r:id="rId26"/>
+    <p:notesMasterId r:id="rId27"/>
   </p:notesMasterIdLst>
   <p:sldIdLst>
     <p:sldId id="256" r:id="rId2"/>
-    <p:sldId id="358" r:id="rId3"/>
-    <p:sldId id="357" r:id="rId4"/>
-    <p:sldId id="359" r:id="rId5"/>
-    <p:sldId id="360" r:id="rId6"/>
-    <p:sldId id="361" r:id="rId7"/>
-    <p:sldId id="363" r:id="rId8"/>
-    <p:sldId id="362" r:id="rId9"/>
-    <p:sldId id="307" r:id="rId10"/>
-    <p:sldId id="344" r:id="rId11"/>
-    <p:sldId id="336" r:id="rId12"/>
-    <p:sldId id="337" r:id="rId13"/>
-    <p:sldId id="300" r:id="rId14"/>
-    <p:sldId id="339" r:id="rId15"/>
-    <p:sldId id="338" r:id="rId16"/>
-    <p:sldId id="349" r:id="rId17"/>
-    <p:sldId id="308" r:id="rId18"/>
-    <p:sldId id="304" r:id="rId19"/>
-    <p:sldId id="309" r:id="rId20"/>
-    <p:sldId id="310" r:id="rId21"/>
-    <p:sldId id="318" r:id="rId22"/>
-    <p:sldId id="356" r:id="rId23"/>
-    <p:sldId id="365" r:id="rId24"/>
-    <p:sldId id="364" r:id="rId25"/>
+    <p:sldId id="366" r:id="rId3"/>
+    <p:sldId id="358" r:id="rId4"/>
+    <p:sldId id="357" r:id="rId5"/>
+    <p:sldId id="359" r:id="rId6"/>
+    <p:sldId id="360" r:id="rId7"/>
+    <p:sldId id="361" r:id="rId8"/>
+    <p:sldId id="363" r:id="rId9"/>
+    <p:sldId id="362" r:id="rId10"/>
+    <p:sldId id="307" r:id="rId11"/>
+    <p:sldId id="344" r:id="rId12"/>
+    <p:sldId id="336" r:id="rId13"/>
+    <p:sldId id="337" r:id="rId14"/>
+    <p:sldId id="300" r:id="rId15"/>
+    <p:sldId id="339" r:id="rId16"/>
+    <p:sldId id="338" r:id="rId17"/>
+    <p:sldId id="349" r:id="rId18"/>
+    <p:sldId id="308" r:id="rId19"/>
+    <p:sldId id="304" r:id="rId20"/>
+    <p:sldId id="309" r:id="rId21"/>
+    <p:sldId id="310" r:id="rId22"/>
+    <p:sldId id="318" r:id="rId23"/>
+    <p:sldId id="356" r:id="rId24"/>
+    <p:sldId id="365" r:id="rId25"/>
+    <p:sldId id="364" r:id="rId26"/>
   </p:sldIdLst>
   <p:sldSz cx="9144000" cy="6858000" type="screen4x3"/>
   <p:notesSz cx="6858000" cy="9144000"/>
@@ -3501,7 +3502,7 @@
           <a:p>
             <a:fld id="{3BAECB10-9972-4830-A584-02C41DAFD45B}" type="slidenum">
               <a:rPr lang="ru-RU" smtClean="0"/>
-              <a:t>12</a:t>
+              <a:t>13</a:t>
             </a:fld>
             <a:endParaRPr lang="ru-RU"/>
           </a:p>
@@ -3605,7 +3606,7 @@
           <a:p>
             <a:fld id="{3BAECB10-9972-4830-A584-02C41DAFD45B}" type="slidenum">
               <a:rPr lang="ru-RU" smtClean="0"/>
-              <a:t>13</a:t>
+              <a:t>14</a:t>
             </a:fld>
             <a:endParaRPr lang="ru-RU"/>
           </a:p>
@@ -6635,8 +6636,8 @@
           <a:lstStyle/>
           <a:p>
             <a:r>
-              <a:rPr lang="ru-RU" sz="8000" dirty="0" smtClean="0"/>
-              <a:t>Качество</a:t>
+              <a:rPr lang="ru-RU" sz="8000" smtClean="0"/>
+              <a:t>Качество кода</a:t>
             </a:r>
             <a:endParaRPr lang="ru-RU" sz="8000" b="1" dirty="0"/>
           </a:p>
@@ -6695,6 +6696,417 @@
           <a:lstStyle/>
           <a:p>
             <a:r>
+              <a:rPr lang="ru-RU" dirty="0" err="1" smtClean="0"/>
+              <a:t>Антипаттерн</a:t>
+            </a:r>
+            <a:r>
+              <a:rPr lang="ru-RU" dirty="0" err="1"/>
+              <a:t>ы</a:t>
+            </a:r>
+            <a:endParaRPr lang="ru-RU" dirty="0"/>
+          </a:p>
+        </p:txBody>
+      </p:sp>
+      <p:sp>
+        <p:nvSpPr>
+          <p:cNvPr id="3" name="Объект 2"/>
+          <p:cNvSpPr>
+            <a:spLocks noGrp="1"/>
+          </p:cNvSpPr>
+          <p:nvPr>
+            <p:ph idx="1"/>
+          </p:nvPr>
+        </p:nvSpPr>
+        <p:spPr/>
+        <p:txBody>
+          <a:bodyPr/>
+          <a:lstStyle/>
+          <a:p>
+            <a:r>
+              <a:rPr lang="en-US" dirty="0" smtClean="0"/>
+              <a:t>Local Hero</a:t>
+            </a:r>
+            <a:endParaRPr lang="ru-RU" dirty="0" smtClean="0"/>
+          </a:p>
+          <a:p>
+            <a:r>
+              <a:rPr lang="en-US" dirty="0" smtClean="0"/>
+              <a:t>Loudmouth</a:t>
+            </a:r>
+            <a:endParaRPr lang="ru-RU" dirty="0"/>
+          </a:p>
+          <a:p>
+            <a:r>
+              <a:rPr lang="en-US" dirty="0" smtClean="0"/>
+              <a:t>Free Ride</a:t>
+            </a:r>
+            <a:endParaRPr lang="ru-RU" dirty="0" smtClean="0"/>
+          </a:p>
+          <a:p>
+            <a:r>
+              <a:rPr lang="en-US" dirty="0" smtClean="0"/>
+              <a:t>Over</a:t>
+            </a:r>
+            <a:r>
+              <a:rPr lang="ru-RU" dirty="0" smtClean="0"/>
+              <a:t> </a:t>
+            </a:r>
+            <a:r>
+              <a:rPr lang="en-US" dirty="0" smtClean="0"/>
+              <a:t>specification</a:t>
+            </a:r>
+          </a:p>
+          <a:p>
+            <a:endParaRPr lang="en-US" dirty="0"/>
+          </a:p>
+          <a:p>
+            <a:pPr marL="0" indent="0">
+              <a:buNone/>
+            </a:pPr>
+            <a:r>
+              <a:rPr lang="en-US" sz="2400" dirty="0">
+                <a:hlinkClick r:id="rId2"/>
+              </a:rPr>
+              <a:t>http://blog.james-carr.org/2006/11/03/tdd-anti-patterns</a:t>
+            </a:r>
+            <a:r>
+              <a:rPr lang="en-US" sz="2400" dirty="0" smtClean="0">
+                <a:hlinkClick r:id="rId2"/>
+              </a:rPr>
+              <a:t>/</a:t>
+            </a:r>
+            <a:r>
+              <a:rPr lang="en-US" sz="2400" dirty="0" smtClean="0"/>
+              <a:t> </a:t>
+            </a:r>
+            <a:endParaRPr lang="ru-RU" sz="2400" dirty="0"/>
+          </a:p>
+        </p:txBody>
+      </p:sp>
+    </p:spTree>
+    <p:extLst>
+      <p:ext uri="{BB962C8B-B14F-4D97-AF65-F5344CB8AC3E}">
+        <p14:creationId xmlns:p14="http://schemas.microsoft.com/office/powerpoint/2010/main" val="4191729357"/>
+      </p:ext>
+    </p:extLst>
+  </p:cSld>
+  <p:clrMapOvr>
+    <a:masterClrMapping/>
+  </p:clrMapOvr>
+  <p:timing>
+    <p:tnLst>
+      <p:par>
+        <p:cTn id="1" dur="indefinite" restart="never" nodeType="tmRoot">
+          <p:childTnLst>
+            <p:seq concurrent="1" nextAc="seek">
+              <p:cTn id="2" dur="indefinite" nodeType="mainSeq">
+                <p:childTnLst>
+                  <p:par>
+                    <p:cTn id="3" fill="hold">
+                      <p:stCondLst>
+                        <p:cond delay="indefinite"/>
+                      </p:stCondLst>
+                      <p:childTnLst>
+                        <p:par>
+                          <p:cTn id="4" fill="hold">
+                            <p:stCondLst>
+                              <p:cond delay="0"/>
+                            </p:stCondLst>
+                            <p:childTnLst>
+                              <p:par>
+                                <p:cTn id="5" presetID="1" presetClass="entr" presetSubtype="0" fill="hold" grpId="0" nodeType="clickEffect">
+                                  <p:stCondLst>
+                                    <p:cond delay="0"/>
+                                  </p:stCondLst>
+                                  <p:childTnLst>
+                                    <p:set>
+                                      <p:cBhvr>
+                                        <p:cTn id="6" dur="1" fill="hold">
+                                          <p:stCondLst>
+                                            <p:cond delay="0"/>
+                                          </p:stCondLst>
+                                        </p:cTn>
+                                        <p:tgtEl>
+                                          <p:spTgt spid="3">
+                                            <p:txEl>
+                                              <p:pRg st="0" end="0"/>
+                                            </p:txEl>
+                                          </p:spTgt>
+                                        </p:tgtEl>
+                                        <p:attrNameLst>
+                                          <p:attrName>style.visibility</p:attrName>
+                                        </p:attrNameLst>
+                                      </p:cBhvr>
+                                      <p:to>
+                                        <p:strVal val="visible"/>
+                                      </p:to>
+                                    </p:set>
+                                  </p:childTnLst>
+                                </p:cTn>
+                              </p:par>
+                            </p:childTnLst>
+                          </p:cTn>
+                        </p:par>
+                      </p:childTnLst>
+                    </p:cTn>
+                  </p:par>
+                  <p:par>
+                    <p:cTn id="7" fill="hold">
+                      <p:stCondLst>
+                        <p:cond delay="indefinite"/>
+                      </p:stCondLst>
+                      <p:childTnLst>
+                        <p:par>
+                          <p:cTn id="8" fill="hold">
+                            <p:stCondLst>
+                              <p:cond delay="0"/>
+                            </p:stCondLst>
+                            <p:childTnLst>
+                              <p:par>
+                                <p:cTn id="9" presetID="1" presetClass="entr" presetSubtype="0" fill="hold" grpId="0" nodeType="clickEffect">
+                                  <p:stCondLst>
+                                    <p:cond delay="0"/>
+                                  </p:stCondLst>
+                                  <p:childTnLst>
+                                    <p:set>
+                                      <p:cBhvr>
+                                        <p:cTn id="10" dur="1" fill="hold">
+                                          <p:stCondLst>
+                                            <p:cond delay="0"/>
+                                          </p:stCondLst>
+                                        </p:cTn>
+                                        <p:tgtEl>
+                                          <p:spTgt spid="3">
+                                            <p:txEl>
+                                              <p:pRg st="1" end="1"/>
+                                            </p:txEl>
+                                          </p:spTgt>
+                                        </p:tgtEl>
+                                        <p:attrNameLst>
+                                          <p:attrName>style.visibility</p:attrName>
+                                        </p:attrNameLst>
+                                      </p:cBhvr>
+                                      <p:to>
+                                        <p:strVal val="visible"/>
+                                      </p:to>
+                                    </p:set>
+                                  </p:childTnLst>
+                                </p:cTn>
+                              </p:par>
+                            </p:childTnLst>
+                          </p:cTn>
+                        </p:par>
+                      </p:childTnLst>
+                    </p:cTn>
+                  </p:par>
+                  <p:par>
+                    <p:cTn id="11" fill="hold">
+                      <p:stCondLst>
+                        <p:cond delay="indefinite"/>
+                      </p:stCondLst>
+                      <p:childTnLst>
+                        <p:par>
+                          <p:cTn id="12" fill="hold">
+                            <p:stCondLst>
+                              <p:cond delay="0"/>
+                            </p:stCondLst>
+                            <p:childTnLst>
+                              <p:par>
+                                <p:cTn id="13" presetID="1" presetClass="entr" presetSubtype="0" fill="hold" grpId="0" nodeType="clickEffect">
+                                  <p:stCondLst>
+                                    <p:cond delay="0"/>
+                                  </p:stCondLst>
+                                  <p:childTnLst>
+                                    <p:set>
+                                      <p:cBhvr>
+                                        <p:cTn id="14" dur="1" fill="hold">
+                                          <p:stCondLst>
+                                            <p:cond delay="0"/>
+                                          </p:stCondLst>
+                                        </p:cTn>
+                                        <p:tgtEl>
+                                          <p:spTgt spid="3">
+                                            <p:txEl>
+                                              <p:pRg st="2" end="2"/>
+                                            </p:txEl>
+                                          </p:spTgt>
+                                        </p:tgtEl>
+                                        <p:attrNameLst>
+                                          <p:attrName>style.visibility</p:attrName>
+                                        </p:attrNameLst>
+                                      </p:cBhvr>
+                                      <p:to>
+                                        <p:strVal val="visible"/>
+                                      </p:to>
+                                    </p:set>
+                                  </p:childTnLst>
+                                </p:cTn>
+                              </p:par>
+                            </p:childTnLst>
+                          </p:cTn>
+                        </p:par>
+                      </p:childTnLst>
+                    </p:cTn>
+                  </p:par>
+                  <p:par>
+                    <p:cTn id="15" fill="hold">
+                      <p:stCondLst>
+                        <p:cond delay="indefinite"/>
+                      </p:stCondLst>
+                      <p:childTnLst>
+                        <p:par>
+                          <p:cTn id="16" fill="hold">
+                            <p:stCondLst>
+                              <p:cond delay="0"/>
+                            </p:stCondLst>
+                            <p:childTnLst>
+                              <p:par>
+                                <p:cTn id="17" presetID="1" presetClass="entr" presetSubtype="0" fill="hold" grpId="0" nodeType="clickEffect">
+                                  <p:stCondLst>
+                                    <p:cond delay="0"/>
+                                  </p:stCondLst>
+                                  <p:childTnLst>
+                                    <p:set>
+                                      <p:cBhvr>
+                                        <p:cTn id="18" dur="1" fill="hold">
+                                          <p:stCondLst>
+                                            <p:cond delay="0"/>
+                                          </p:stCondLst>
+                                        </p:cTn>
+                                        <p:tgtEl>
+                                          <p:spTgt spid="3">
+                                            <p:txEl>
+                                              <p:pRg st="3" end="3"/>
+                                            </p:txEl>
+                                          </p:spTgt>
+                                        </p:tgtEl>
+                                        <p:attrNameLst>
+                                          <p:attrName>style.visibility</p:attrName>
+                                        </p:attrNameLst>
+                                      </p:cBhvr>
+                                      <p:to>
+                                        <p:strVal val="visible"/>
+                                      </p:to>
+                                    </p:set>
+                                  </p:childTnLst>
+                                </p:cTn>
+                              </p:par>
+                            </p:childTnLst>
+                          </p:cTn>
+                        </p:par>
+                      </p:childTnLst>
+                    </p:cTn>
+                  </p:par>
+                  <p:par>
+                    <p:cTn id="19" fill="hold">
+                      <p:stCondLst>
+                        <p:cond delay="indefinite"/>
+                      </p:stCondLst>
+                      <p:childTnLst>
+                        <p:par>
+                          <p:cTn id="20" fill="hold">
+                            <p:stCondLst>
+                              <p:cond delay="0"/>
+                            </p:stCondLst>
+                            <p:childTnLst>
+                              <p:par>
+                                <p:cTn id="21" presetID="1" presetClass="entr" presetSubtype="0" fill="hold" grpId="0" nodeType="clickEffect">
+                                  <p:stCondLst>
+                                    <p:cond delay="0"/>
+                                  </p:stCondLst>
+                                  <p:childTnLst>
+                                    <p:set>
+                                      <p:cBhvr>
+                                        <p:cTn id="22" dur="1" fill="hold">
+                                          <p:stCondLst>
+                                            <p:cond delay="0"/>
+                                          </p:stCondLst>
+                                        </p:cTn>
+                                        <p:tgtEl>
+                                          <p:spTgt spid="3">
+                                            <p:txEl>
+                                              <p:pRg st="5" end="5"/>
+                                            </p:txEl>
+                                          </p:spTgt>
+                                        </p:tgtEl>
+                                        <p:attrNameLst>
+                                          <p:attrName>style.visibility</p:attrName>
+                                        </p:attrNameLst>
+                                      </p:cBhvr>
+                                      <p:to>
+                                        <p:strVal val="visible"/>
+                                      </p:to>
+                                    </p:set>
+                                  </p:childTnLst>
+                                </p:cTn>
+                              </p:par>
+                            </p:childTnLst>
+                          </p:cTn>
+                        </p:par>
+                      </p:childTnLst>
+                    </p:cTn>
+                  </p:par>
+                </p:childTnLst>
+              </p:cTn>
+              <p:prevCondLst>
+                <p:cond evt="onPrev" delay="0">
+                  <p:tgtEl>
+                    <p:sldTgt/>
+                  </p:tgtEl>
+                </p:cond>
+              </p:prevCondLst>
+              <p:nextCondLst>
+                <p:cond evt="onNext" delay="0">
+                  <p:tgtEl>
+                    <p:sldTgt/>
+                  </p:tgtEl>
+                </p:cond>
+              </p:nextCondLst>
+            </p:seq>
+          </p:childTnLst>
+        </p:cTn>
+      </p:par>
+    </p:tnLst>
+    <p:bldLst>
+      <p:bldP spid="3" grpId="0" build="p"/>
+    </p:bldLst>
+  </p:timing>
+</p:sld>
+</file>
+
+<file path=ppt/slides/slide11.xml><?xml version="1.0" encoding="utf-8"?>
+<p:sld xmlns:a="http://schemas.openxmlformats.org/drawingml/2006/main" xmlns:r="http://schemas.openxmlformats.org/officeDocument/2006/relationships" xmlns:p="http://schemas.openxmlformats.org/presentationml/2006/main">
+  <p:cSld>
+    <p:spTree>
+      <p:nvGrpSpPr>
+        <p:cNvPr id="1" name=""/>
+        <p:cNvGrpSpPr/>
+        <p:nvPr/>
+      </p:nvGrpSpPr>
+      <p:grpSpPr>
+        <a:xfrm>
+          <a:off x="0" y="0"/>
+          <a:ext cx="0" cy="0"/>
+          <a:chOff x="0" y="0"/>
+          <a:chExt cx="0" cy="0"/>
+        </a:xfrm>
+      </p:grpSpPr>
+      <p:sp>
+        <p:nvSpPr>
+          <p:cNvPr id="2" name="Заголовок 1"/>
+          <p:cNvSpPr>
+            <a:spLocks noGrp="1"/>
+          </p:cNvSpPr>
+          <p:nvPr>
+            <p:ph type="title"/>
+          </p:nvPr>
+        </p:nvSpPr>
+        <p:spPr/>
+        <p:txBody>
+          <a:bodyPr/>
+          <a:lstStyle/>
+          <a:p>
+            <a:r>
               <a:rPr lang="en-US" dirty="0" smtClean="0"/>
               <a:t>DRY</a:t>
             </a:r>
@@ -6757,7 +7169,7 @@
 </p:sld>
 </file>
 
-<file path=ppt/slides/slide11.xml><?xml version="1.0" encoding="utf-8"?>
+<file path=ppt/slides/slide12.xml><?xml version="1.0" encoding="utf-8"?>
 <p:sld xmlns:a="http://schemas.openxmlformats.org/drawingml/2006/main" xmlns:r="http://schemas.openxmlformats.org/officeDocument/2006/relationships" xmlns:p="http://schemas.openxmlformats.org/presentationml/2006/main">
   <p:cSld>
     <p:spTree>
@@ -6929,7 +7341,7 @@
 </p:sld>
 </file>
 
-<file path=ppt/slides/slide12.xml><?xml version="1.0" encoding="utf-8"?>
+<file path=ppt/slides/slide13.xml><?xml version="1.0" encoding="utf-8"?>
 <p:sld xmlns:a="http://schemas.openxmlformats.org/drawingml/2006/main" xmlns:r="http://schemas.openxmlformats.org/officeDocument/2006/relationships" xmlns:p="http://schemas.openxmlformats.org/presentationml/2006/main">
   <p:cSld>
     <p:spTree>
@@ -6991,105 +7403,6 @@
 </p:sld>
 </file>
 
-<file path=ppt/slides/slide13.xml><?xml version="1.0" encoding="utf-8"?>
-<p:sld xmlns:a="http://schemas.openxmlformats.org/drawingml/2006/main" xmlns:r="http://schemas.openxmlformats.org/officeDocument/2006/relationships" xmlns:p="http://schemas.openxmlformats.org/presentationml/2006/main">
-  <p:cSld>
-    <p:spTree>
-      <p:nvGrpSpPr>
-        <p:cNvPr id="1" name=""/>
-        <p:cNvGrpSpPr/>
-        <p:nvPr/>
-      </p:nvGrpSpPr>
-      <p:grpSpPr>
-        <a:xfrm>
-          <a:off x="0" y="0"/>
-          <a:ext cx="0" cy="0"/>
-          <a:chOff x="0" y="0"/>
-          <a:chExt cx="0" cy="0"/>
-        </a:xfrm>
-      </p:grpSpPr>
-      <p:sp>
-        <p:nvSpPr>
-          <p:cNvPr id="2" name="Заголовок 1"/>
-          <p:cNvSpPr>
-            <a:spLocks noGrp="1"/>
-          </p:cNvSpPr>
-          <p:nvPr>
-            <p:ph type="title"/>
-          </p:nvPr>
-        </p:nvSpPr>
-        <p:spPr/>
-        <p:txBody>
-          <a:bodyPr/>
-          <a:lstStyle/>
-          <a:p>
-            <a:r>
-              <a:rPr lang="en-US" dirty="0" smtClean="0"/>
-              <a:t>DAMP: </a:t>
-            </a:r>
-            <a:r>
-              <a:rPr lang="ru-RU" dirty="0" smtClean="0"/>
-              <a:t>Анатомия теста</a:t>
-            </a:r>
-            <a:endParaRPr lang="ru-RU" dirty="0"/>
-          </a:p>
-        </p:txBody>
-      </p:sp>
-      <p:sp>
-        <p:nvSpPr>
-          <p:cNvPr id="3" name="Объект 2"/>
-          <p:cNvSpPr>
-            <a:spLocks noGrp="1"/>
-          </p:cNvSpPr>
-          <p:nvPr>
-            <p:ph idx="1"/>
-          </p:nvPr>
-        </p:nvSpPr>
-        <p:spPr/>
-        <p:txBody>
-          <a:bodyPr/>
-          <a:lstStyle/>
-          <a:p>
-            <a:r>
-              <a:rPr lang="en-US" dirty="0" smtClean="0"/>
-              <a:t>Arrange</a:t>
-            </a:r>
-          </a:p>
-          <a:p>
-            <a:r>
-              <a:rPr lang="en-US" dirty="0" smtClean="0"/>
-              <a:t>Act</a:t>
-            </a:r>
-          </a:p>
-          <a:p>
-            <a:r>
-              <a:rPr lang="en-US" dirty="0" smtClean="0"/>
-              <a:t>Assert</a:t>
-            </a:r>
-            <a:endParaRPr lang="ru-RU" dirty="0"/>
-          </a:p>
-        </p:txBody>
-      </p:sp>
-    </p:spTree>
-    <p:extLst>
-      <p:ext uri="{BB962C8B-B14F-4D97-AF65-F5344CB8AC3E}">
-        <p14:creationId xmlns:p14="http://schemas.microsoft.com/office/powerpoint/2010/main" val="400814519"/>
-      </p:ext>
-    </p:extLst>
-  </p:cSld>
-  <p:clrMapOvr>
-    <a:masterClrMapping/>
-  </p:clrMapOvr>
-  <p:timing>
-    <p:tnLst>
-      <p:par>
-        <p:cTn id="1" dur="indefinite" restart="never" nodeType="tmRoot"/>
-      </p:par>
-    </p:tnLst>
-  </p:timing>
-</p:sld>
-</file>
-
 <file path=ppt/slides/slide14.xml><?xml version="1.0" encoding="utf-8"?>
 <p:sld xmlns:a="http://schemas.openxmlformats.org/drawingml/2006/main" xmlns:r="http://schemas.openxmlformats.org/officeDocument/2006/relationships" xmlns:p="http://schemas.openxmlformats.org/presentationml/2006/main">
   <p:cSld>
@@ -7124,7 +7437,11 @@
           <a:p>
             <a:r>
               <a:rPr lang="en-US" dirty="0" smtClean="0"/>
-              <a:t>DRY</a:t>
+              <a:t>DAMP: </a:t>
+            </a:r>
+            <a:r>
+              <a:rPr lang="ru-RU" dirty="0" smtClean="0"/>
+              <a:t>Анатомия теста</a:t>
             </a:r>
             <a:endParaRPr lang="ru-RU" dirty="0"/>
           </a:p>
@@ -7146,39 +7463,21 @@
           <a:lstStyle/>
           <a:p>
             <a:r>
-              <a:rPr lang="en-US" dirty="0" err="1" smtClean="0"/>
-              <a:t>SetUp</a:t>
-            </a:r>
-            <a:endParaRPr lang="en-US" dirty="0" smtClean="0"/>
-          </a:p>
-          <a:p>
-            <a:r>
-              <a:rPr lang="en-US" dirty="0" err="1" smtClean="0"/>
-              <a:t>ObjectMother</a:t>
-            </a:r>
-            <a:r>
               <a:rPr lang="en-US" dirty="0" smtClean="0"/>
-              <a:t> / Builders</a:t>
+              <a:t>Arrange</a:t>
             </a:r>
           </a:p>
           <a:p>
             <a:r>
               <a:rPr lang="en-US" dirty="0" smtClean="0"/>
-              <a:t>Comparer, Equal, </a:t>
-            </a:r>
-            <a:r>
-              <a:rPr lang="en-US" dirty="0" err="1" smtClean="0"/>
-              <a:t>ToString</a:t>
-            </a:r>
-            <a:endParaRPr lang="en-US" dirty="0" smtClean="0"/>
+              <a:t>Act</a:t>
+            </a:r>
           </a:p>
           <a:p>
             <a:r>
               <a:rPr lang="en-US" dirty="0" smtClean="0"/>
-              <a:t>Asserts</a:t>
-            </a:r>
-          </a:p>
-          <a:p>
+              <a:t>Assert</a:t>
+            </a:r>
             <a:endParaRPr lang="ru-RU" dirty="0"/>
           </a:p>
         </p:txBody>
@@ -7186,7 +7485,7 @@
     </p:spTree>
     <p:extLst>
       <p:ext uri="{BB962C8B-B14F-4D97-AF65-F5344CB8AC3E}">
-        <p14:creationId xmlns:p14="http://schemas.microsoft.com/office/powerpoint/2010/main" val="3860920475"/>
+        <p14:creationId xmlns:p14="http://schemas.microsoft.com/office/powerpoint/2010/main" val="400814519"/>
       </p:ext>
     </p:extLst>
   </p:cSld>
@@ -7237,6 +7536,119 @@
           <a:p>
             <a:r>
               <a:rPr lang="en-US" dirty="0" smtClean="0"/>
+              <a:t>DRY</a:t>
+            </a:r>
+            <a:endParaRPr lang="ru-RU" dirty="0"/>
+          </a:p>
+        </p:txBody>
+      </p:sp>
+      <p:sp>
+        <p:nvSpPr>
+          <p:cNvPr id="3" name="Объект 2"/>
+          <p:cNvSpPr>
+            <a:spLocks noGrp="1"/>
+          </p:cNvSpPr>
+          <p:nvPr>
+            <p:ph idx="1"/>
+          </p:nvPr>
+        </p:nvSpPr>
+        <p:spPr/>
+        <p:txBody>
+          <a:bodyPr/>
+          <a:lstStyle/>
+          <a:p>
+            <a:r>
+              <a:rPr lang="en-US" dirty="0" err="1" smtClean="0"/>
+              <a:t>SetUp</a:t>
+            </a:r>
+            <a:endParaRPr lang="en-US" dirty="0" smtClean="0"/>
+          </a:p>
+          <a:p>
+            <a:r>
+              <a:rPr lang="en-US" dirty="0" err="1" smtClean="0"/>
+              <a:t>ObjectMother</a:t>
+            </a:r>
+            <a:r>
+              <a:rPr lang="en-US" dirty="0" smtClean="0"/>
+              <a:t> / Builders</a:t>
+            </a:r>
+          </a:p>
+          <a:p>
+            <a:r>
+              <a:rPr lang="en-US" dirty="0" smtClean="0"/>
+              <a:t>Comparer, Equal, </a:t>
+            </a:r>
+            <a:r>
+              <a:rPr lang="en-US" dirty="0" err="1" smtClean="0"/>
+              <a:t>ToString</a:t>
+            </a:r>
+            <a:endParaRPr lang="en-US" dirty="0" smtClean="0"/>
+          </a:p>
+          <a:p>
+            <a:r>
+              <a:rPr lang="en-US" dirty="0" smtClean="0"/>
+              <a:t>Asserts</a:t>
+            </a:r>
+          </a:p>
+          <a:p>
+            <a:endParaRPr lang="ru-RU" dirty="0"/>
+          </a:p>
+        </p:txBody>
+      </p:sp>
+    </p:spTree>
+    <p:extLst>
+      <p:ext uri="{BB962C8B-B14F-4D97-AF65-F5344CB8AC3E}">
+        <p14:creationId xmlns:p14="http://schemas.microsoft.com/office/powerpoint/2010/main" val="3860920475"/>
+      </p:ext>
+    </p:extLst>
+  </p:cSld>
+  <p:clrMapOvr>
+    <a:masterClrMapping/>
+  </p:clrMapOvr>
+  <p:timing>
+    <p:tnLst>
+      <p:par>
+        <p:cTn id="1" dur="indefinite" restart="never" nodeType="tmRoot"/>
+      </p:par>
+    </p:tnLst>
+  </p:timing>
+</p:sld>
+</file>
+
+<file path=ppt/slides/slide16.xml><?xml version="1.0" encoding="utf-8"?>
+<p:sld xmlns:a="http://schemas.openxmlformats.org/drawingml/2006/main" xmlns:r="http://schemas.openxmlformats.org/officeDocument/2006/relationships" xmlns:p="http://schemas.openxmlformats.org/presentationml/2006/main">
+  <p:cSld>
+    <p:spTree>
+      <p:nvGrpSpPr>
+        <p:cNvPr id="1" name=""/>
+        <p:cNvGrpSpPr/>
+        <p:nvPr/>
+      </p:nvGrpSpPr>
+      <p:grpSpPr>
+        <a:xfrm>
+          <a:off x="0" y="0"/>
+          <a:ext cx="0" cy="0"/>
+          <a:chOff x="0" y="0"/>
+          <a:chExt cx="0" cy="0"/>
+        </a:xfrm>
+      </p:grpSpPr>
+      <p:sp>
+        <p:nvSpPr>
+          <p:cNvPr id="2" name="Заголовок 1"/>
+          <p:cNvSpPr>
+            <a:spLocks noGrp="1"/>
+          </p:cNvSpPr>
+          <p:nvPr>
+            <p:ph type="title"/>
+          </p:nvPr>
+        </p:nvSpPr>
+        <p:spPr/>
+        <p:txBody>
+          <a:bodyPr/>
+          <a:lstStyle/>
+          <a:p>
+            <a:r>
+              <a:rPr lang="en-US" dirty="0" smtClean="0"/>
               <a:t>Parametrized tests</a:t>
             </a:r>
             <a:endParaRPr lang="ru-RU" dirty="0"/>
@@ -7331,7 +7743,7 @@
 </p:sld>
 </file>
 
-<file path=ppt/slides/slide16.xml><?xml version="1.0" encoding="utf-8"?>
+<file path=ppt/slides/slide17.xml><?xml version="1.0" encoding="utf-8"?>
 <p:sld xmlns:a="http://schemas.openxmlformats.org/drawingml/2006/main" xmlns:r="http://schemas.openxmlformats.org/officeDocument/2006/relationships" xmlns:p="http://schemas.openxmlformats.org/presentationml/2006/main">
   <p:cSld>
     <p:spTree>
@@ -7560,7 +7972,7 @@
 </p:sld>
 </file>
 
-<file path=ppt/slides/slide17.xml><?xml version="1.0" encoding="utf-8"?>
+<file path=ppt/slides/slide18.xml><?xml version="1.0" encoding="utf-8"?>
 <p:sld xmlns:a="http://schemas.openxmlformats.org/drawingml/2006/main" xmlns:r="http://schemas.openxmlformats.org/officeDocument/2006/relationships" xmlns:p="http://schemas.openxmlformats.org/presentationml/2006/main">
   <p:cSld>
     <p:spTree>
@@ -8000,7 +8412,7 @@
 </p:sld>
 </file>
 
-<file path=ppt/slides/slide18.xml><?xml version="1.0" encoding="utf-8"?>
+<file path=ppt/slides/slide19.xml><?xml version="1.0" encoding="utf-8"?>
 <p:sld xmlns:a="http://schemas.openxmlformats.org/drawingml/2006/main" xmlns:r="http://schemas.openxmlformats.org/officeDocument/2006/relationships" xmlns:p="http://schemas.openxmlformats.org/presentationml/2006/main">
   <p:cSld>
     <p:spTree>
@@ -8432,7 +8844,126 @@
 </p:sld>
 </file>
 
-<file path=ppt/slides/slide19.xml><?xml version="1.0" encoding="utf-8"?>
+<file path=ppt/slides/slide2.xml><?xml version="1.0" encoding="utf-8"?>
+<p:sld xmlns:a="http://schemas.openxmlformats.org/drawingml/2006/main" xmlns:r="http://schemas.openxmlformats.org/officeDocument/2006/relationships" xmlns:p="http://schemas.openxmlformats.org/presentationml/2006/main">
+  <p:cSld>
+    <p:spTree>
+      <p:nvGrpSpPr>
+        <p:cNvPr id="1" name=""/>
+        <p:cNvGrpSpPr/>
+        <p:nvPr/>
+      </p:nvGrpSpPr>
+      <p:grpSpPr>
+        <a:xfrm>
+          <a:off x="0" y="0"/>
+          <a:ext cx="0" cy="0"/>
+          <a:chOff x="0" y="0"/>
+          <a:chExt cx="0" cy="0"/>
+        </a:xfrm>
+      </p:grpSpPr>
+      <p:sp>
+        <p:nvSpPr>
+          <p:cNvPr id="2" name="Заголовок 1"/>
+          <p:cNvSpPr>
+            <a:spLocks noGrp="1"/>
+          </p:cNvSpPr>
+          <p:nvPr>
+            <p:ph type="title"/>
+          </p:nvPr>
+        </p:nvSpPr>
+        <p:spPr/>
+        <p:txBody>
+          <a:bodyPr/>
+          <a:lstStyle/>
+          <a:p>
+            <a:r>
+              <a:rPr lang="ru-RU" dirty="0" smtClean="0"/>
+              <a:t>Организационное</a:t>
+            </a:r>
+            <a:endParaRPr lang="ru-RU" dirty="0"/>
+          </a:p>
+        </p:txBody>
+      </p:sp>
+      <p:sp>
+        <p:nvSpPr>
+          <p:cNvPr id="3" name="Объект 2"/>
+          <p:cNvSpPr>
+            <a:spLocks noGrp="1"/>
+          </p:cNvSpPr>
+          <p:nvPr>
+            <p:ph idx="1"/>
+          </p:nvPr>
+        </p:nvSpPr>
+        <p:spPr/>
+        <p:txBody>
+          <a:bodyPr>
+            <a:normAutofit/>
+          </a:bodyPr>
+          <a:lstStyle/>
+          <a:p>
+            <a:r>
+              <a:rPr lang="en-US" sz="2800" dirty="0" smtClean="0">
+                <a:hlinkClick r:id="rId2"/>
+              </a:rPr>
+              <a:t>https</a:t>
+            </a:r>
+            <a:r>
+              <a:rPr lang="en-US" sz="2800" dirty="0">
+                <a:hlinkClick r:id="rId2"/>
+              </a:rPr>
+              <a:t>://</a:t>
+            </a:r>
+            <a:r>
+              <a:rPr lang="en-US" sz="2800" dirty="0" smtClean="0">
+                <a:hlinkClick r:id="rId2"/>
+              </a:rPr>
+              <a:t>github.com/kontur-school-2015</a:t>
+            </a:r>
+            <a:endParaRPr lang="ru-RU" sz="2800" dirty="0" smtClean="0"/>
+          </a:p>
+          <a:p>
+            <a:r>
+              <a:rPr lang="ru-RU" sz="2800" dirty="0" smtClean="0"/>
+              <a:t>Пары</a:t>
+            </a:r>
+          </a:p>
+          <a:p>
+            <a:r>
+              <a:rPr lang="ru-RU" sz="2800" dirty="0" smtClean="0"/>
+              <a:t>Чай-плюшки</a:t>
+            </a:r>
+          </a:p>
+          <a:p>
+            <a:r>
+              <a:rPr lang="ru-RU" sz="2800" dirty="0" smtClean="0"/>
+              <a:t>Группа</a:t>
+            </a:r>
+          </a:p>
+          <a:p>
+            <a:endParaRPr lang="en-US" sz="2800" dirty="0"/>
+          </a:p>
+          <a:p>
+            <a:pPr marL="0" indent="0">
+              <a:buNone/>
+            </a:pPr>
+            <a:endParaRPr lang="ru-RU" sz="2800" dirty="0"/>
+          </a:p>
+        </p:txBody>
+      </p:sp>
+    </p:spTree>
+    <p:extLst>
+      <p:ext uri="{BB962C8B-B14F-4D97-AF65-F5344CB8AC3E}">
+        <p14:creationId xmlns:p14="http://schemas.microsoft.com/office/powerpoint/2010/main" val="3561457331"/>
+      </p:ext>
+    </p:extLst>
+  </p:cSld>
+  <p:clrMapOvr>
+    <a:masterClrMapping/>
+  </p:clrMapOvr>
+</p:sld>
+</file>
+
+<file path=ppt/slides/slide20.xml><?xml version="1.0" encoding="utf-8"?>
 <p:sld xmlns:a="http://schemas.openxmlformats.org/drawingml/2006/main" xmlns:r="http://schemas.openxmlformats.org/officeDocument/2006/relationships" xmlns:p="http://schemas.openxmlformats.org/presentationml/2006/main">
   <p:cSld>
     <p:spTree>
@@ -8826,504 +9357,7 @@
 </p:sld>
 </file>
 
-<file path=ppt/slides/slide2.xml><?xml version="1.0" encoding="utf-8"?>
-<p:sld xmlns:a="http://schemas.openxmlformats.org/drawingml/2006/main" xmlns:r="http://schemas.openxmlformats.org/officeDocument/2006/relationships" xmlns:p="http://schemas.openxmlformats.org/presentationml/2006/main">
-  <p:cSld>
-    <p:spTree>
-      <p:nvGrpSpPr>
-        <p:cNvPr id="1" name=""/>
-        <p:cNvGrpSpPr/>
-        <p:nvPr/>
-      </p:nvGrpSpPr>
-      <p:grpSpPr>
-        <a:xfrm>
-          <a:off x="0" y="0"/>
-          <a:ext cx="0" cy="0"/>
-          <a:chOff x="0" y="0"/>
-          <a:chExt cx="0" cy="0"/>
-        </a:xfrm>
-      </p:grpSpPr>
-      <p:sp>
-        <p:nvSpPr>
-          <p:cNvPr id="3" name="Объект 2"/>
-          <p:cNvSpPr>
-            <a:spLocks noGrp="1"/>
-          </p:cNvSpPr>
-          <p:nvPr>
-            <p:ph idx="1"/>
-          </p:nvPr>
-        </p:nvSpPr>
-        <p:spPr>
-          <a:xfrm>
-            <a:off x="457200" y="476672"/>
-            <a:ext cx="8229600" cy="5649491"/>
-          </a:xfrm>
-        </p:spPr>
-        <p:txBody>
-          <a:bodyPr>
-            <a:normAutofit/>
-          </a:bodyPr>
-          <a:lstStyle/>
-          <a:p>
-            <a:pPr marL="0" indent="0">
-              <a:buNone/>
-            </a:pPr>
-            <a:r>
-              <a:rPr lang="en-US" sz="2000" dirty="0">
-                <a:solidFill>
-                  <a:srgbClr val="0000FF"/>
-                </a:solidFill>
-                <a:highlight>
-                  <a:srgbClr val="FFFFFF"/>
-                </a:highlight>
-                <a:latin typeface="Fira Code" panose="00000509000000000000" pitchFamily="49" charset="0"/>
-              </a:rPr>
-              <a:t>public</a:t>
-            </a:r>
-            <a:r>
-              <a:rPr lang="en-US" sz="2000" dirty="0">
-                <a:solidFill>
-                  <a:srgbClr val="000000"/>
-                </a:solidFill>
-                <a:highlight>
-                  <a:srgbClr val="FFFFFF"/>
-                </a:highlight>
-                <a:latin typeface="Fira Code" panose="00000509000000000000" pitchFamily="49" charset="0"/>
-              </a:rPr>
-              <a:t> </a:t>
-            </a:r>
-            <a:r>
-              <a:rPr lang="en-US" sz="2000" dirty="0">
-                <a:solidFill>
-                  <a:srgbClr val="0000FF"/>
-                </a:solidFill>
-                <a:highlight>
-                  <a:srgbClr val="FFFFFF"/>
-                </a:highlight>
-                <a:latin typeface="Fira Code" panose="00000509000000000000" pitchFamily="49" charset="0"/>
-              </a:rPr>
-              <a:t>interface</a:t>
-            </a:r>
-            <a:r>
-              <a:rPr lang="en-US" sz="2000" dirty="0">
-                <a:solidFill>
-                  <a:srgbClr val="000000"/>
-                </a:solidFill>
-                <a:highlight>
-                  <a:srgbClr val="FFFFFF"/>
-                </a:highlight>
-                <a:latin typeface="Fira Code" panose="00000509000000000000" pitchFamily="49" charset="0"/>
-              </a:rPr>
-              <a:t> </a:t>
-            </a:r>
-            <a:r>
-              <a:rPr lang="en-US" sz="2000" dirty="0" err="1">
-                <a:solidFill>
-                  <a:srgbClr val="2B91AF"/>
-                </a:solidFill>
-                <a:highlight>
-                  <a:srgbClr val="FFFFFF"/>
-                </a:highlight>
-                <a:latin typeface="Fira Code" panose="00000509000000000000" pitchFamily="49" charset="0"/>
-              </a:rPr>
-              <a:t>IWordsStatistics</a:t>
-            </a:r>
-            <a:endParaRPr lang="en-US" sz="2000" dirty="0">
-              <a:solidFill>
-                <a:srgbClr val="000000"/>
-              </a:solidFill>
-              <a:highlight>
-                <a:srgbClr val="FFFFFF"/>
-              </a:highlight>
-              <a:latin typeface="Fira Code" panose="00000509000000000000" pitchFamily="49" charset="0"/>
-            </a:endParaRPr>
-          </a:p>
-          <a:p>
-            <a:pPr marL="0" indent="0">
-              <a:buNone/>
-            </a:pPr>
-            <a:r>
-              <a:rPr lang="ru-RU" sz="2000" dirty="0">
-                <a:solidFill>
-                  <a:srgbClr val="000000"/>
-                </a:solidFill>
-                <a:highlight>
-                  <a:srgbClr val="FFFFFF"/>
-                </a:highlight>
-                <a:latin typeface="Fira Code" panose="00000509000000000000" pitchFamily="49" charset="0"/>
-              </a:rPr>
-              <a:t>{</a:t>
-            </a:r>
-          </a:p>
-          <a:p>
-            <a:pPr marL="0" indent="0">
-              <a:buNone/>
-            </a:pPr>
-            <a:r>
-              <a:rPr lang="en-US" sz="2000" dirty="0" smtClean="0">
-                <a:solidFill>
-                  <a:srgbClr val="0000FF"/>
-                </a:solidFill>
-                <a:highlight>
-                  <a:srgbClr val="FFFFFF"/>
-                </a:highlight>
-                <a:latin typeface="Fira Code" panose="00000509000000000000" pitchFamily="49" charset="0"/>
-              </a:rPr>
-              <a:t>	void</a:t>
-            </a:r>
-            <a:r>
-              <a:rPr lang="en-US" sz="2000" dirty="0" smtClean="0">
-                <a:solidFill>
-                  <a:srgbClr val="000000"/>
-                </a:solidFill>
-                <a:highlight>
-                  <a:srgbClr val="FFFFFF"/>
-                </a:highlight>
-                <a:latin typeface="Fira Code" panose="00000509000000000000" pitchFamily="49" charset="0"/>
-              </a:rPr>
-              <a:t> </a:t>
-            </a:r>
-            <a:r>
-              <a:rPr lang="en-US" sz="2000" dirty="0" err="1">
-                <a:solidFill>
-                  <a:srgbClr val="000000"/>
-                </a:solidFill>
-                <a:highlight>
-                  <a:srgbClr val="FFFFFF"/>
-                </a:highlight>
-                <a:latin typeface="Fira Code" panose="00000509000000000000" pitchFamily="49" charset="0"/>
-              </a:rPr>
-              <a:t>AddWord</a:t>
-            </a:r>
-            <a:r>
-              <a:rPr lang="en-US" sz="2000" dirty="0">
-                <a:solidFill>
-                  <a:srgbClr val="000000"/>
-                </a:solidFill>
-                <a:highlight>
-                  <a:srgbClr val="FFFFFF"/>
-                </a:highlight>
-                <a:latin typeface="Fira Code" panose="00000509000000000000" pitchFamily="49" charset="0"/>
-              </a:rPr>
-              <a:t>(</a:t>
-            </a:r>
-            <a:r>
-              <a:rPr lang="en-US" sz="2000" dirty="0">
-                <a:solidFill>
-                  <a:srgbClr val="0000FF"/>
-                </a:solidFill>
-                <a:highlight>
-                  <a:srgbClr val="FFFFFF"/>
-                </a:highlight>
-                <a:latin typeface="Fira Code" panose="00000509000000000000" pitchFamily="49" charset="0"/>
-              </a:rPr>
-              <a:t>string</a:t>
-            </a:r>
-            <a:r>
-              <a:rPr lang="en-US" sz="2000" dirty="0">
-                <a:solidFill>
-                  <a:srgbClr val="000000"/>
-                </a:solidFill>
-                <a:highlight>
-                  <a:srgbClr val="FFFFFF"/>
-                </a:highlight>
-                <a:latin typeface="Fira Code" panose="00000509000000000000" pitchFamily="49" charset="0"/>
-              </a:rPr>
-              <a:t> word);</a:t>
-            </a:r>
-          </a:p>
-          <a:p>
-            <a:pPr marL="0" indent="0">
-              <a:buNone/>
-            </a:pPr>
-            <a:r>
-              <a:rPr lang="en-US" sz="2000" dirty="0" smtClean="0">
-                <a:solidFill>
-                  <a:srgbClr val="2B91AF"/>
-                </a:solidFill>
-                <a:highlight>
-                  <a:srgbClr val="FFFFFF"/>
-                </a:highlight>
-                <a:latin typeface="Fira Code" panose="00000509000000000000" pitchFamily="49" charset="0"/>
-              </a:rPr>
-              <a:t>	Tuple</a:t>
-            </a:r>
-            <a:r>
-              <a:rPr lang="en-US" sz="2000" dirty="0" smtClean="0">
-                <a:solidFill>
-                  <a:srgbClr val="000000"/>
-                </a:solidFill>
-                <a:highlight>
-                  <a:srgbClr val="FFFFFF"/>
-                </a:highlight>
-                <a:latin typeface="Fira Code" panose="00000509000000000000" pitchFamily="49" charset="0"/>
-              </a:rPr>
-              <a:t>&lt;</a:t>
-            </a:r>
-            <a:r>
-              <a:rPr lang="en-US" sz="2000" dirty="0" err="1" smtClean="0">
-                <a:solidFill>
-                  <a:srgbClr val="0000FF"/>
-                </a:solidFill>
-                <a:highlight>
-                  <a:srgbClr val="FFFFFF"/>
-                </a:highlight>
-                <a:latin typeface="Fira Code" panose="00000509000000000000" pitchFamily="49" charset="0"/>
-              </a:rPr>
-              <a:t>int</a:t>
-            </a:r>
-            <a:r>
-              <a:rPr lang="en-US" sz="2000" dirty="0">
-                <a:solidFill>
-                  <a:srgbClr val="000000"/>
-                </a:solidFill>
-                <a:highlight>
-                  <a:srgbClr val="FFFFFF"/>
-                </a:highlight>
-                <a:latin typeface="Fira Code" panose="00000509000000000000" pitchFamily="49" charset="0"/>
-              </a:rPr>
-              <a:t>, </a:t>
-            </a:r>
-            <a:r>
-              <a:rPr lang="en-US" sz="2000" dirty="0">
-                <a:solidFill>
-                  <a:srgbClr val="0000FF"/>
-                </a:solidFill>
-                <a:highlight>
-                  <a:srgbClr val="FFFFFF"/>
-                </a:highlight>
-                <a:latin typeface="Fira Code" panose="00000509000000000000" pitchFamily="49" charset="0"/>
-              </a:rPr>
-              <a:t>string</a:t>
-            </a:r>
-            <a:r>
-              <a:rPr lang="en-US" sz="2000" dirty="0">
-                <a:solidFill>
-                  <a:srgbClr val="000000"/>
-                </a:solidFill>
-                <a:highlight>
-                  <a:srgbClr val="FFFFFF"/>
-                </a:highlight>
-                <a:latin typeface="Fira Code" panose="00000509000000000000" pitchFamily="49" charset="0"/>
-              </a:rPr>
-              <a:t>&gt;[] </a:t>
-            </a:r>
-            <a:r>
-              <a:rPr lang="en-US" sz="2000" dirty="0" err="1">
-                <a:solidFill>
-                  <a:srgbClr val="000000"/>
-                </a:solidFill>
-                <a:highlight>
-                  <a:srgbClr val="FFFFFF"/>
-                </a:highlight>
-                <a:latin typeface="Fira Code" panose="00000509000000000000" pitchFamily="49" charset="0"/>
-              </a:rPr>
-              <a:t>GetStatistics</a:t>
-            </a:r>
-            <a:r>
-              <a:rPr lang="en-US" sz="2000" dirty="0">
-                <a:solidFill>
-                  <a:srgbClr val="000000"/>
-                </a:solidFill>
-                <a:highlight>
-                  <a:srgbClr val="FFFFFF"/>
-                </a:highlight>
-                <a:latin typeface="Fira Code" panose="00000509000000000000" pitchFamily="49" charset="0"/>
-              </a:rPr>
-              <a:t>();</a:t>
-            </a:r>
-          </a:p>
-          <a:p>
-            <a:pPr marL="0" indent="0">
-              <a:buNone/>
-            </a:pPr>
-            <a:r>
-              <a:rPr lang="ru-RU" sz="2000" dirty="0" smtClean="0">
-                <a:solidFill>
-                  <a:srgbClr val="000000"/>
-                </a:solidFill>
-                <a:highlight>
-                  <a:srgbClr val="FFFFFF"/>
-                </a:highlight>
-                <a:latin typeface="Fira Code" panose="00000509000000000000" pitchFamily="49" charset="0"/>
-              </a:rPr>
-              <a:t>}</a:t>
-            </a:r>
-            <a:endParaRPr lang="en-US" sz="2000" dirty="0" smtClean="0">
-              <a:solidFill>
-                <a:srgbClr val="000000"/>
-              </a:solidFill>
-              <a:highlight>
-                <a:srgbClr val="FFFFFF"/>
-              </a:highlight>
-              <a:latin typeface="Fira Code" panose="00000509000000000000" pitchFamily="49" charset="0"/>
-            </a:endParaRPr>
-          </a:p>
-          <a:p>
-            <a:pPr marL="0" indent="0">
-              <a:buNone/>
-            </a:pPr>
-            <a:endParaRPr lang="en-US" sz="2000" dirty="0">
-              <a:solidFill>
-                <a:srgbClr val="000000"/>
-              </a:solidFill>
-              <a:highlight>
-                <a:srgbClr val="FFFFFF"/>
-              </a:highlight>
-              <a:latin typeface="Fira Code" panose="00000509000000000000" pitchFamily="49" charset="0"/>
-            </a:endParaRPr>
-          </a:p>
-          <a:p>
-            <a:r>
-              <a:rPr lang="ru-RU" sz="2800" dirty="0" smtClean="0">
-                <a:solidFill>
-                  <a:srgbClr val="000000"/>
-                </a:solidFill>
-                <a:highlight>
-                  <a:srgbClr val="FFFFFF"/>
-                </a:highlight>
-              </a:rPr>
-              <a:t>Частотный словарь по префиксу слова длины 10</a:t>
-            </a:r>
-          </a:p>
-          <a:p>
-            <a:r>
-              <a:rPr lang="ru-RU" sz="2800" dirty="0" smtClean="0">
-                <a:solidFill>
-                  <a:srgbClr val="000000"/>
-                </a:solidFill>
-                <a:highlight>
-                  <a:srgbClr val="FFFFFF"/>
-                </a:highlight>
-              </a:rPr>
-              <a:t>Без </a:t>
-            </a:r>
-            <a:r>
-              <a:rPr lang="ru-RU" sz="2800" dirty="0">
-                <a:solidFill>
-                  <a:srgbClr val="000000"/>
-                </a:solidFill>
-                <a:highlight>
-                  <a:srgbClr val="FFFFFF"/>
-                </a:highlight>
-              </a:rPr>
-              <a:t>учета </a:t>
-            </a:r>
-            <a:r>
-              <a:rPr lang="ru-RU" sz="2800" dirty="0" smtClean="0">
-                <a:solidFill>
-                  <a:srgbClr val="000000"/>
-                </a:solidFill>
-                <a:highlight>
-                  <a:srgbClr val="FFFFFF"/>
-                </a:highlight>
-              </a:rPr>
-              <a:t>регистра</a:t>
-            </a:r>
-          </a:p>
-          <a:p>
-            <a:r>
-              <a:rPr lang="ru-RU" sz="2800" dirty="0" smtClean="0">
-                <a:solidFill>
-                  <a:srgbClr val="000000"/>
-                </a:solidFill>
-                <a:highlight>
-                  <a:srgbClr val="FFFFFF"/>
-                </a:highlight>
-              </a:rPr>
-              <a:t>Без учета пустых слов и </a:t>
-            </a:r>
-            <a:r>
-              <a:rPr lang="en-US" sz="2800" dirty="0" smtClean="0">
-                <a:solidFill>
-                  <a:srgbClr val="000000"/>
-                </a:solidFill>
-                <a:highlight>
-                  <a:srgbClr val="FFFFFF"/>
-                </a:highlight>
-              </a:rPr>
-              <a:t>null-</a:t>
-            </a:r>
-            <a:r>
-              <a:rPr lang="ru-RU" sz="2800" dirty="0" err="1" smtClean="0">
-                <a:solidFill>
-                  <a:srgbClr val="000000"/>
-                </a:solidFill>
-                <a:highlight>
-                  <a:srgbClr val="FFFFFF"/>
-                </a:highlight>
-              </a:rPr>
-              <a:t>ов</a:t>
-            </a:r>
-            <a:endParaRPr lang="en-US" sz="2800" dirty="0" smtClean="0">
-              <a:solidFill>
-                <a:srgbClr val="000000"/>
-              </a:solidFill>
-              <a:highlight>
-                <a:srgbClr val="FFFFFF"/>
-              </a:highlight>
-            </a:endParaRPr>
-          </a:p>
-          <a:p>
-            <a:pPr marL="0" indent="0">
-              <a:buNone/>
-            </a:pPr>
-            <a:endParaRPr lang="ru-RU" sz="4400" dirty="0" smtClean="0">
-              <a:solidFill>
-                <a:srgbClr val="000000"/>
-              </a:solidFill>
-              <a:highlight>
-                <a:srgbClr val="FFFFFF"/>
-              </a:highlight>
-            </a:endParaRPr>
-          </a:p>
-          <a:p>
-            <a:pPr marL="0" indent="0">
-              <a:buNone/>
-            </a:pPr>
-            <a:r>
-              <a:rPr lang="ru-RU" sz="4400" dirty="0" smtClean="0">
-                <a:solidFill>
-                  <a:srgbClr val="000000"/>
-                </a:solidFill>
-                <a:highlight>
-                  <a:srgbClr val="FFFFFF"/>
-                </a:highlight>
-              </a:rPr>
-              <a:t>Какие нужны тесты?</a:t>
-            </a:r>
-            <a:endParaRPr lang="en-US" sz="4400" dirty="0">
-              <a:solidFill>
-                <a:srgbClr val="000000"/>
-              </a:solidFill>
-              <a:highlight>
-                <a:srgbClr val="FFFFFF"/>
-              </a:highlight>
-            </a:endParaRPr>
-          </a:p>
-        </p:txBody>
-      </p:sp>
-    </p:spTree>
-    <p:extLst>
-      <p:ext uri="{BB962C8B-B14F-4D97-AF65-F5344CB8AC3E}">
-        <p14:creationId xmlns:p14="http://schemas.microsoft.com/office/powerpoint/2010/main" val="3515574030"/>
-      </p:ext>
-    </p:extLst>
-  </p:cSld>
-  <p:clrMapOvr>
-    <a:masterClrMapping/>
-  </p:clrMapOvr>
-  <p:timing>
-    <p:tnLst>
-      <p:par>
-        <p:cTn id="1" dur="indefinite" restart="never" nodeType="tmRoot"/>
-      </p:par>
-    </p:tnLst>
-  </p:timing>
-</p:sld>
-</file>
-
-<file path=ppt/slides/slide20.xml><?xml version="1.0" encoding="utf-8"?>
+<file path=ppt/slides/slide21.xml><?xml version="1.0" encoding="utf-8"?>
 <p:sld xmlns:a="http://schemas.openxmlformats.org/drawingml/2006/main" xmlns:r="http://schemas.openxmlformats.org/officeDocument/2006/relationships" xmlns:p="http://schemas.openxmlformats.org/presentationml/2006/main">
   <p:cSld>
     <p:spTree>
@@ -9664,148 +9698,6 @@
 </p:sld>
 </file>
 
-<file path=ppt/slides/slide21.xml><?xml version="1.0" encoding="utf-8"?>
-<p:sld xmlns:a="http://schemas.openxmlformats.org/drawingml/2006/main" xmlns:r="http://schemas.openxmlformats.org/officeDocument/2006/relationships" xmlns:p="http://schemas.openxmlformats.org/presentationml/2006/main">
-  <p:cSld>
-    <p:spTree>
-      <p:nvGrpSpPr>
-        <p:cNvPr id="1" name=""/>
-        <p:cNvGrpSpPr/>
-        <p:nvPr/>
-      </p:nvGrpSpPr>
-      <p:grpSpPr>
-        <a:xfrm>
-          <a:off x="0" y="0"/>
-          <a:ext cx="0" cy="0"/>
-          <a:chOff x="0" y="0"/>
-          <a:chExt cx="0" cy="0"/>
-        </a:xfrm>
-      </p:grpSpPr>
-      <p:sp>
-        <p:nvSpPr>
-          <p:cNvPr id="2" name="Заголовок 1"/>
-          <p:cNvSpPr>
-            <a:spLocks noGrp="1"/>
-          </p:cNvSpPr>
-          <p:nvPr>
-            <p:ph type="title"/>
-          </p:nvPr>
-        </p:nvSpPr>
-        <p:spPr/>
-        <p:txBody>
-          <a:bodyPr/>
-          <a:lstStyle/>
-          <a:p>
-            <a:r>
-              <a:rPr lang="ru-RU" dirty="0" smtClean="0"/>
-              <a:t>Практика (30 мин)</a:t>
-            </a:r>
-            <a:endParaRPr lang="ru-RU" dirty="0"/>
-          </a:p>
-        </p:txBody>
-      </p:sp>
-      <p:sp>
-        <p:nvSpPr>
-          <p:cNvPr id="3" name="Объект 2"/>
-          <p:cNvSpPr>
-            <a:spLocks noGrp="1"/>
-          </p:cNvSpPr>
-          <p:nvPr>
-            <p:ph idx="1"/>
-          </p:nvPr>
-        </p:nvSpPr>
-        <p:spPr/>
-        <p:txBody>
-          <a:bodyPr>
-            <a:normAutofit/>
-          </a:bodyPr>
-          <a:lstStyle/>
-          <a:p>
-            <a:pPr marL="0" indent="0">
-              <a:buNone/>
-            </a:pPr>
-            <a:r>
-              <a:rPr lang="ru-RU" dirty="0" smtClean="0"/>
-              <a:t>Проведите </a:t>
-            </a:r>
-            <a:r>
-              <a:rPr lang="ru-RU" dirty="0" err="1" smtClean="0"/>
-              <a:t>рефакторинг</a:t>
-            </a:r>
-            <a:r>
-              <a:rPr lang="ru-RU" dirty="0" smtClean="0"/>
-              <a:t> тестов в проекте </a:t>
-            </a:r>
-            <a:r>
-              <a:rPr lang="en-US" dirty="0" smtClean="0"/>
-              <a:t>Patterns/Exercise</a:t>
-            </a:r>
-            <a:r>
-              <a:rPr lang="ru-RU" dirty="0" smtClean="0"/>
-              <a:t>. Цели:</a:t>
-            </a:r>
-            <a:endParaRPr lang="ru-RU" dirty="0"/>
-          </a:p>
-          <a:p>
-            <a:r>
-              <a:rPr lang="ru-RU" dirty="0"/>
-              <a:t>Без </a:t>
-            </a:r>
-            <a:r>
-              <a:rPr lang="ru-RU" dirty="0" err="1"/>
-              <a:t>антипаттернов</a:t>
-            </a:r>
-            <a:endParaRPr lang="ru-RU" dirty="0"/>
-          </a:p>
-          <a:p>
-            <a:r>
-              <a:rPr lang="en-US" dirty="0" smtClean="0"/>
-              <a:t>AAA</a:t>
-            </a:r>
-          </a:p>
-          <a:p>
-            <a:r>
-              <a:rPr lang="en-US" dirty="0" smtClean="0"/>
-              <a:t>DRY</a:t>
-            </a:r>
-            <a:r>
-              <a:rPr lang="ru-RU" dirty="0" smtClean="0"/>
-              <a:t> + </a:t>
-            </a:r>
-            <a:r>
-              <a:rPr lang="en-US" dirty="0" smtClean="0"/>
-              <a:t>DAMP</a:t>
-            </a:r>
-          </a:p>
-          <a:p>
-            <a:r>
-              <a:rPr lang="ru-RU" dirty="0" smtClean="0"/>
-              <a:t>Имена тестов (тесты как спецификация)</a:t>
-            </a:r>
-            <a:endParaRPr lang="en-US" dirty="0" smtClean="0"/>
-          </a:p>
-        </p:txBody>
-      </p:sp>
-    </p:spTree>
-    <p:extLst>
-      <p:ext uri="{BB962C8B-B14F-4D97-AF65-F5344CB8AC3E}">
-        <p14:creationId xmlns:p14="http://schemas.microsoft.com/office/powerpoint/2010/main" val="3496491581"/>
-      </p:ext>
-    </p:extLst>
-  </p:cSld>
-  <p:clrMapOvr>
-    <a:masterClrMapping/>
-  </p:clrMapOvr>
-  <p:timing>
-    <p:tnLst>
-      <p:par>
-        <p:cTn id="1" dur="indefinite" restart="never" nodeType="tmRoot"/>
-      </p:par>
-    </p:tnLst>
-  </p:timing>
-</p:sld>
-</file>
-
 <file path=ppt/slides/slide22.xml><?xml version="1.0" encoding="utf-8"?>
 <p:sld xmlns:a="http://schemas.openxmlformats.org/drawingml/2006/main" xmlns:r="http://schemas.openxmlformats.org/officeDocument/2006/relationships" xmlns:p="http://schemas.openxmlformats.org/presentationml/2006/main">
   <p:cSld>
@@ -9840,7 +9732,7 @@
           <a:p>
             <a:r>
               <a:rPr lang="ru-RU" dirty="0" smtClean="0"/>
-              <a:t>Анализ задачи</a:t>
+              <a:t>Практика (30 мин)</a:t>
             </a:r>
             <a:endParaRPr lang="ru-RU" dirty="0"/>
           </a:p>
@@ -9858,139 +9750,80 @@
         </p:nvSpPr>
         <p:spPr/>
         <p:txBody>
-          <a:bodyPr/>
+          <a:bodyPr>
+            <a:normAutofit/>
+          </a:bodyPr>
           <a:lstStyle/>
-          <a:p>
-            <a:r>
-              <a:rPr lang="en-US" dirty="0" smtClean="0"/>
-              <a:t>Equals </a:t>
-            </a:r>
-            <a:r>
-              <a:rPr lang="ru-RU" dirty="0" smtClean="0"/>
-              <a:t>или </a:t>
-            </a:r>
-            <a:r>
-              <a:rPr lang="en-US" dirty="0" err="1" smtClean="0"/>
-              <a:t>ToString</a:t>
-            </a:r>
-            <a:r>
-              <a:rPr lang="en-US" dirty="0" smtClean="0"/>
-              <a:t> </a:t>
-            </a:r>
-            <a:r>
-              <a:rPr lang="ru-RU" dirty="0" smtClean="0"/>
-              <a:t>у </a:t>
-            </a:r>
-            <a:r>
-              <a:rPr lang="en-US" dirty="0" err="1" smtClean="0"/>
-              <a:t>TextDocument</a:t>
-            </a:r>
-            <a:r>
-              <a:rPr lang="ru-RU" dirty="0" smtClean="0"/>
-              <a:t> (</a:t>
-            </a:r>
-            <a:r>
-              <a:rPr lang="en-US" dirty="0" smtClean="0"/>
-              <a:t>DRY)</a:t>
-            </a:r>
-            <a:endParaRPr lang="ru-RU" dirty="0"/>
-          </a:p>
-          <a:p>
-            <a:r>
-              <a:rPr lang="ru-RU" dirty="0" smtClean="0"/>
-              <a:t>Убрать </a:t>
-            </a:r>
-            <a:r>
-              <a:rPr lang="en-US" dirty="0" err="1" smtClean="0"/>
-              <a:t>SetUp</a:t>
-            </a:r>
-            <a:r>
-              <a:rPr lang="ru-RU" dirty="0" smtClean="0"/>
-              <a:t> и константу (</a:t>
-            </a:r>
-            <a:r>
-              <a:rPr lang="en-US" dirty="0" smtClean="0"/>
-              <a:t>DUMP)</a:t>
-            </a:r>
-            <a:endParaRPr lang="ru-RU" dirty="0" smtClean="0"/>
-          </a:p>
-          <a:p>
-            <a:r>
-              <a:rPr lang="ru-RU" dirty="0" smtClean="0"/>
-              <a:t>Упростить </a:t>
-            </a:r>
-            <a:r>
-              <a:rPr lang="en-US" dirty="0" err="1" smtClean="0"/>
-              <a:t>MoreComplex</a:t>
-            </a:r>
-            <a:r>
-              <a:rPr lang="en-US" dirty="0" smtClean="0"/>
-              <a:t> (KISS)</a:t>
-            </a:r>
-            <a:endParaRPr lang="en-US" dirty="0"/>
-          </a:p>
-          <a:p>
-            <a:r>
-              <a:rPr lang="ru-RU" dirty="0" smtClean="0"/>
-              <a:t>Разбить </a:t>
-            </a:r>
-            <a:r>
-              <a:rPr lang="en-US" dirty="0" err="1" smtClean="0"/>
-              <a:t>TestUndo</a:t>
-            </a:r>
-            <a:r>
-              <a:rPr lang="en-US" dirty="0" smtClean="0"/>
-              <a:t> (AAA)</a:t>
-            </a:r>
-            <a:endParaRPr lang="ru-RU" dirty="0" smtClean="0"/>
-          </a:p>
-          <a:p>
-            <a:r>
-              <a:rPr lang="ru-RU" dirty="0" smtClean="0"/>
-              <a:t>Имена тестов</a:t>
-            </a:r>
-            <a:r>
-              <a:rPr lang="en-US" dirty="0" smtClean="0"/>
-              <a:t> (Tests as Specs)</a:t>
-            </a:r>
-            <a:endParaRPr lang="ru-RU" dirty="0" smtClean="0"/>
-          </a:p>
-          <a:p>
-            <a:r>
-              <a:rPr lang="en-US" dirty="0" smtClean="0"/>
-              <a:t>Assert </a:t>
-            </a:r>
-            <a:r>
-              <a:rPr lang="ru-RU" dirty="0" smtClean="0"/>
-              <a:t>для проверки пары </a:t>
-            </a:r>
-            <a:r>
-              <a:rPr lang="en-US" dirty="0" smtClean="0"/>
-              <a:t>Undo-Redo</a:t>
-            </a:r>
-            <a:endParaRPr lang="ru-RU" dirty="0" smtClean="0"/>
-          </a:p>
-          <a:p>
-            <a:endParaRPr lang="ru-RU" dirty="0" smtClean="0"/>
-          </a:p>
           <a:p>
             <a:pPr marL="0" indent="0">
               <a:buNone/>
             </a:pPr>
+            <a:r>
+              <a:rPr lang="ru-RU" dirty="0" smtClean="0"/>
+              <a:t>Проведите </a:t>
+            </a:r>
+            <a:r>
+              <a:rPr lang="ru-RU" dirty="0" err="1" smtClean="0"/>
+              <a:t>рефакторинг</a:t>
+            </a:r>
+            <a:r>
+              <a:rPr lang="ru-RU" dirty="0" smtClean="0"/>
+              <a:t> тестов в проекте </a:t>
+            </a:r>
+            <a:r>
+              <a:rPr lang="en-US" dirty="0" smtClean="0"/>
+              <a:t>Patterns/Exercise</a:t>
+            </a:r>
+            <a:r>
+              <a:rPr lang="ru-RU" dirty="0" smtClean="0"/>
+              <a:t>. Цели:</a:t>
+            </a:r>
             <a:endParaRPr lang="ru-RU" dirty="0"/>
           </a:p>
           <a:p>
-            <a:pPr marL="0" indent="0">
-              <a:buNone/>
-            </a:pPr>
+            <a:r>
+              <a:rPr lang="ru-RU" dirty="0"/>
+              <a:t>Без </a:t>
+            </a:r>
+            <a:r>
+              <a:rPr lang="ru-RU" dirty="0" err="1"/>
+              <a:t>антипаттернов</a:t>
+            </a:r>
             <a:endParaRPr lang="ru-RU" dirty="0"/>
+          </a:p>
+          <a:p>
+            <a:r>
+              <a:rPr lang="en-US" dirty="0" smtClean="0"/>
+              <a:t>AAA</a:t>
+            </a:r>
+          </a:p>
+          <a:p>
+            <a:r>
+              <a:rPr lang="en-US" dirty="0" smtClean="0"/>
+              <a:t>DRY</a:t>
+            </a:r>
+            <a:r>
+              <a:rPr lang="ru-RU" dirty="0" smtClean="0"/>
+              <a:t> + </a:t>
+            </a:r>
+            <a:r>
+              <a:rPr lang="en-US" dirty="0" smtClean="0"/>
+              <a:t>DAMP</a:t>
+            </a:r>
+          </a:p>
+          <a:p>
+            <a:r>
+              <a:rPr lang="ru-RU" dirty="0" smtClean="0"/>
+              <a:t>Имена тестов (тесты как спецификация)</a:t>
+            </a:r>
+            <a:endParaRPr lang="en-US" dirty="0" smtClean="0"/>
           </a:p>
         </p:txBody>
       </p:sp>
     </p:spTree>
     <p:extLst>
       <p:ext uri="{BB962C8B-B14F-4D97-AF65-F5344CB8AC3E}">
-        <p14:creationId xmlns:p14="http://schemas.microsoft.com/office/powerpoint/2010/main" val="3151332467"/>
+        <p14:creationId xmlns:p14="http://schemas.microsoft.com/office/powerpoint/2010/main" val="3496491581"/>
       </p:ext>
     </p:extLst>
   </p:cSld>
@@ -10041,6 +9874,207 @@
           <a:p>
             <a:r>
               <a:rPr lang="ru-RU" dirty="0" smtClean="0"/>
+              <a:t>Анализ задачи</a:t>
+            </a:r>
+            <a:endParaRPr lang="ru-RU" dirty="0"/>
+          </a:p>
+        </p:txBody>
+      </p:sp>
+      <p:sp>
+        <p:nvSpPr>
+          <p:cNvPr id="3" name="Объект 2"/>
+          <p:cNvSpPr>
+            <a:spLocks noGrp="1"/>
+          </p:cNvSpPr>
+          <p:nvPr>
+            <p:ph idx="1"/>
+          </p:nvPr>
+        </p:nvSpPr>
+        <p:spPr/>
+        <p:txBody>
+          <a:bodyPr/>
+          <a:lstStyle/>
+          <a:p>
+            <a:r>
+              <a:rPr lang="en-US" dirty="0" smtClean="0"/>
+              <a:t>Equals </a:t>
+            </a:r>
+            <a:r>
+              <a:rPr lang="ru-RU" dirty="0" smtClean="0"/>
+              <a:t>или </a:t>
+            </a:r>
+            <a:r>
+              <a:rPr lang="en-US" dirty="0" err="1" smtClean="0"/>
+              <a:t>ToString</a:t>
+            </a:r>
+            <a:r>
+              <a:rPr lang="en-US" dirty="0" smtClean="0"/>
+              <a:t> </a:t>
+            </a:r>
+            <a:r>
+              <a:rPr lang="ru-RU" dirty="0" smtClean="0"/>
+              <a:t>у </a:t>
+            </a:r>
+            <a:r>
+              <a:rPr lang="en-US" dirty="0" err="1" smtClean="0"/>
+              <a:t>TextDocument</a:t>
+            </a:r>
+            <a:r>
+              <a:rPr lang="ru-RU" dirty="0" smtClean="0"/>
+              <a:t> (</a:t>
+            </a:r>
+            <a:r>
+              <a:rPr lang="en-US" dirty="0" smtClean="0"/>
+              <a:t>DRY)</a:t>
+            </a:r>
+            <a:endParaRPr lang="ru-RU" dirty="0"/>
+          </a:p>
+          <a:p>
+            <a:r>
+              <a:rPr lang="ru-RU" dirty="0" smtClean="0"/>
+              <a:t>Убрать </a:t>
+            </a:r>
+            <a:r>
+              <a:rPr lang="en-US" dirty="0" err="1" smtClean="0"/>
+              <a:t>SetUp</a:t>
+            </a:r>
+            <a:r>
+              <a:rPr lang="ru-RU" dirty="0" smtClean="0"/>
+              <a:t> и константу (</a:t>
+            </a:r>
+            <a:r>
+              <a:rPr lang="en-US" dirty="0" smtClean="0"/>
+              <a:t>DUMP)</a:t>
+            </a:r>
+            <a:endParaRPr lang="ru-RU" dirty="0" smtClean="0"/>
+          </a:p>
+          <a:p>
+            <a:r>
+              <a:rPr lang="ru-RU" dirty="0" smtClean="0"/>
+              <a:t>Упростить </a:t>
+            </a:r>
+            <a:r>
+              <a:rPr lang="en-US" dirty="0" err="1" smtClean="0"/>
+              <a:t>MoreComplex</a:t>
+            </a:r>
+            <a:r>
+              <a:rPr lang="en-US" dirty="0" smtClean="0"/>
+              <a:t> (KISS)</a:t>
+            </a:r>
+            <a:endParaRPr lang="en-US" dirty="0"/>
+          </a:p>
+          <a:p>
+            <a:r>
+              <a:rPr lang="ru-RU" dirty="0" smtClean="0"/>
+              <a:t>Разбить </a:t>
+            </a:r>
+            <a:r>
+              <a:rPr lang="en-US" dirty="0" err="1" smtClean="0"/>
+              <a:t>TestUndo</a:t>
+            </a:r>
+            <a:r>
+              <a:rPr lang="en-US" dirty="0" smtClean="0"/>
+              <a:t> (AAA)</a:t>
+            </a:r>
+            <a:endParaRPr lang="ru-RU" dirty="0" smtClean="0"/>
+          </a:p>
+          <a:p>
+            <a:r>
+              <a:rPr lang="ru-RU" dirty="0" smtClean="0"/>
+              <a:t>Имена тестов</a:t>
+            </a:r>
+            <a:r>
+              <a:rPr lang="en-US" dirty="0" smtClean="0"/>
+              <a:t> (Tests as Specs)</a:t>
+            </a:r>
+            <a:endParaRPr lang="ru-RU" dirty="0" smtClean="0"/>
+          </a:p>
+          <a:p>
+            <a:r>
+              <a:rPr lang="en-US" dirty="0" smtClean="0"/>
+              <a:t>Assert </a:t>
+            </a:r>
+            <a:r>
+              <a:rPr lang="ru-RU" dirty="0" smtClean="0"/>
+              <a:t>для проверки пары </a:t>
+            </a:r>
+            <a:r>
+              <a:rPr lang="en-US" dirty="0" smtClean="0"/>
+              <a:t>Undo-Redo</a:t>
+            </a:r>
+            <a:endParaRPr lang="ru-RU" dirty="0" smtClean="0"/>
+          </a:p>
+          <a:p>
+            <a:endParaRPr lang="ru-RU" dirty="0" smtClean="0"/>
+          </a:p>
+          <a:p>
+            <a:pPr marL="0" indent="0">
+              <a:buNone/>
+            </a:pPr>
+            <a:endParaRPr lang="ru-RU" dirty="0"/>
+          </a:p>
+          <a:p>
+            <a:pPr marL="0" indent="0">
+              <a:buNone/>
+            </a:pPr>
+            <a:endParaRPr lang="ru-RU" dirty="0"/>
+          </a:p>
+        </p:txBody>
+      </p:sp>
+    </p:spTree>
+    <p:extLst>
+      <p:ext uri="{BB962C8B-B14F-4D97-AF65-F5344CB8AC3E}">
+        <p14:creationId xmlns:p14="http://schemas.microsoft.com/office/powerpoint/2010/main" val="3151332467"/>
+      </p:ext>
+    </p:extLst>
+  </p:cSld>
+  <p:clrMapOvr>
+    <a:masterClrMapping/>
+  </p:clrMapOvr>
+  <p:timing>
+    <p:tnLst>
+      <p:par>
+        <p:cTn id="1" dur="indefinite" restart="never" nodeType="tmRoot"/>
+      </p:par>
+    </p:tnLst>
+  </p:timing>
+</p:sld>
+</file>
+
+<file path=ppt/slides/slide24.xml><?xml version="1.0" encoding="utf-8"?>
+<p:sld xmlns:a="http://schemas.openxmlformats.org/drawingml/2006/main" xmlns:r="http://schemas.openxmlformats.org/officeDocument/2006/relationships" xmlns:p="http://schemas.openxmlformats.org/presentationml/2006/main">
+  <p:cSld>
+    <p:spTree>
+      <p:nvGrpSpPr>
+        <p:cNvPr id="1" name=""/>
+        <p:cNvGrpSpPr/>
+        <p:nvPr/>
+      </p:nvGrpSpPr>
+      <p:grpSpPr>
+        <a:xfrm>
+          <a:off x="0" y="0"/>
+          <a:ext cx="0" cy="0"/>
+          <a:chOff x="0" y="0"/>
+          <a:chExt cx="0" cy="0"/>
+        </a:xfrm>
+      </p:grpSpPr>
+      <p:sp>
+        <p:nvSpPr>
+          <p:cNvPr id="2" name="Заголовок 1"/>
+          <p:cNvSpPr>
+            <a:spLocks noGrp="1"/>
+          </p:cNvSpPr>
+          <p:nvPr>
+            <p:ph type="title"/>
+          </p:nvPr>
+        </p:nvSpPr>
+        <p:spPr/>
+        <p:txBody>
+          <a:bodyPr/>
+          <a:lstStyle/>
+          <a:p>
+            <a:r>
+              <a:rPr lang="ru-RU" dirty="0" smtClean="0"/>
               <a:t>Хитрые штуки</a:t>
             </a:r>
             <a:endParaRPr lang="ru-RU" dirty="0"/>
@@ -10096,7 +10130,7 @@
 </p:sld>
 </file>
 
-<file path=ppt/slides/slide24.xml><?xml version="1.0" encoding="utf-8"?>
+<file path=ppt/slides/slide25.xml><?xml version="1.0" encoding="utf-8"?>
 <p:sld xmlns:a="http://schemas.openxmlformats.org/drawingml/2006/main" xmlns:r="http://schemas.openxmlformats.org/officeDocument/2006/relationships" xmlns:p="http://schemas.openxmlformats.org/presentationml/2006/main">
   <p:cSld>
     <p:spTree>
@@ -10215,6 +10249,503 @@
       </p:grpSpPr>
       <p:sp>
         <p:nvSpPr>
+          <p:cNvPr id="3" name="Объект 2"/>
+          <p:cNvSpPr>
+            <a:spLocks noGrp="1"/>
+          </p:cNvSpPr>
+          <p:nvPr>
+            <p:ph idx="1"/>
+          </p:nvPr>
+        </p:nvSpPr>
+        <p:spPr>
+          <a:xfrm>
+            <a:off x="457200" y="476672"/>
+            <a:ext cx="8229600" cy="5649491"/>
+          </a:xfrm>
+        </p:spPr>
+        <p:txBody>
+          <a:bodyPr>
+            <a:normAutofit/>
+          </a:bodyPr>
+          <a:lstStyle/>
+          <a:p>
+            <a:pPr marL="0" indent="0">
+              <a:buNone/>
+            </a:pPr>
+            <a:r>
+              <a:rPr lang="en-US" sz="2000" dirty="0">
+                <a:solidFill>
+                  <a:srgbClr val="0000FF"/>
+                </a:solidFill>
+                <a:highlight>
+                  <a:srgbClr val="FFFFFF"/>
+                </a:highlight>
+                <a:latin typeface="Fira Code" panose="00000509000000000000" pitchFamily="49" charset="0"/>
+              </a:rPr>
+              <a:t>public</a:t>
+            </a:r>
+            <a:r>
+              <a:rPr lang="en-US" sz="2000" dirty="0">
+                <a:solidFill>
+                  <a:srgbClr val="000000"/>
+                </a:solidFill>
+                <a:highlight>
+                  <a:srgbClr val="FFFFFF"/>
+                </a:highlight>
+                <a:latin typeface="Fira Code" panose="00000509000000000000" pitchFamily="49" charset="0"/>
+              </a:rPr>
+              <a:t> </a:t>
+            </a:r>
+            <a:r>
+              <a:rPr lang="en-US" sz="2000" dirty="0">
+                <a:solidFill>
+                  <a:srgbClr val="0000FF"/>
+                </a:solidFill>
+                <a:highlight>
+                  <a:srgbClr val="FFFFFF"/>
+                </a:highlight>
+                <a:latin typeface="Fira Code" panose="00000509000000000000" pitchFamily="49" charset="0"/>
+              </a:rPr>
+              <a:t>interface</a:t>
+            </a:r>
+            <a:r>
+              <a:rPr lang="en-US" sz="2000" dirty="0">
+                <a:solidFill>
+                  <a:srgbClr val="000000"/>
+                </a:solidFill>
+                <a:highlight>
+                  <a:srgbClr val="FFFFFF"/>
+                </a:highlight>
+                <a:latin typeface="Fira Code" panose="00000509000000000000" pitchFamily="49" charset="0"/>
+              </a:rPr>
+              <a:t> </a:t>
+            </a:r>
+            <a:r>
+              <a:rPr lang="en-US" sz="2000" dirty="0" err="1">
+                <a:solidFill>
+                  <a:srgbClr val="2B91AF"/>
+                </a:solidFill>
+                <a:highlight>
+                  <a:srgbClr val="FFFFFF"/>
+                </a:highlight>
+                <a:latin typeface="Fira Code" panose="00000509000000000000" pitchFamily="49" charset="0"/>
+              </a:rPr>
+              <a:t>IWordsStatistics</a:t>
+            </a:r>
+            <a:endParaRPr lang="en-US" sz="2000" dirty="0">
+              <a:solidFill>
+                <a:srgbClr val="000000"/>
+              </a:solidFill>
+              <a:highlight>
+                <a:srgbClr val="FFFFFF"/>
+              </a:highlight>
+              <a:latin typeface="Fira Code" panose="00000509000000000000" pitchFamily="49" charset="0"/>
+            </a:endParaRPr>
+          </a:p>
+          <a:p>
+            <a:pPr marL="0" indent="0">
+              <a:buNone/>
+            </a:pPr>
+            <a:r>
+              <a:rPr lang="ru-RU" sz="2000" dirty="0">
+                <a:solidFill>
+                  <a:srgbClr val="000000"/>
+                </a:solidFill>
+                <a:highlight>
+                  <a:srgbClr val="FFFFFF"/>
+                </a:highlight>
+                <a:latin typeface="Fira Code" panose="00000509000000000000" pitchFamily="49" charset="0"/>
+              </a:rPr>
+              <a:t>{</a:t>
+            </a:r>
+          </a:p>
+          <a:p>
+            <a:pPr marL="0" indent="0">
+              <a:buNone/>
+            </a:pPr>
+            <a:r>
+              <a:rPr lang="en-US" sz="2000" dirty="0" smtClean="0">
+                <a:solidFill>
+                  <a:srgbClr val="0000FF"/>
+                </a:solidFill>
+                <a:highlight>
+                  <a:srgbClr val="FFFFFF"/>
+                </a:highlight>
+                <a:latin typeface="Fira Code" panose="00000509000000000000" pitchFamily="49" charset="0"/>
+              </a:rPr>
+              <a:t>	void</a:t>
+            </a:r>
+            <a:r>
+              <a:rPr lang="en-US" sz="2000" dirty="0" smtClean="0">
+                <a:solidFill>
+                  <a:srgbClr val="000000"/>
+                </a:solidFill>
+                <a:highlight>
+                  <a:srgbClr val="FFFFFF"/>
+                </a:highlight>
+                <a:latin typeface="Fira Code" panose="00000509000000000000" pitchFamily="49" charset="0"/>
+              </a:rPr>
+              <a:t> </a:t>
+            </a:r>
+            <a:r>
+              <a:rPr lang="en-US" sz="2000" dirty="0" err="1">
+                <a:solidFill>
+                  <a:srgbClr val="000000"/>
+                </a:solidFill>
+                <a:highlight>
+                  <a:srgbClr val="FFFFFF"/>
+                </a:highlight>
+                <a:latin typeface="Fira Code" panose="00000509000000000000" pitchFamily="49" charset="0"/>
+              </a:rPr>
+              <a:t>AddWord</a:t>
+            </a:r>
+            <a:r>
+              <a:rPr lang="en-US" sz="2000" dirty="0">
+                <a:solidFill>
+                  <a:srgbClr val="000000"/>
+                </a:solidFill>
+                <a:highlight>
+                  <a:srgbClr val="FFFFFF"/>
+                </a:highlight>
+                <a:latin typeface="Fira Code" panose="00000509000000000000" pitchFamily="49" charset="0"/>
+              </a:rPr>
+              <a:t>(</a:t>
+            </a:r>
+            <a:r>
+              <a:rPr lang="en-US" sz="2000" dirty="0">
+                <a:solidFill>
+                  <a:srgbClr val="0000FF"/>
+                </a:solidFill>
+                <a:highlight>
+                  <a:srgbClr val="FFFFFF"/>
+                </a:highlight>
+                <a:latin typeface="Fira Code" panose="00000509000000000000" pitchFamily="49" charset="0"/>
+              </a:rPr>
+              <a:t>string</a:t>
+            </a:r>
+            <a:r>
+              <a:rPr lang="en-US" sz="2000" dirty="0">
+                <a:solidFill>
+                  <a:srgbClr val="000000"/>
+                </a:solidFill>
+                <a:highlight>
+                  <a:srgbClr val="FFFFFF"/>
+                </a:highlight>
+                <a:latin typeface="Fira Code" panose="00000509000000000000" pitchFamily="49" charset="0"/>
+              </a:rPr>
+              <a:t> word);</a:t>
+            </a:r>
+          </a:p>
+          <a:p>
+            <a:pPr marL="0" indent="0">
+              <a:buNone/>
+            </a:pPr>
+            <a:r>
+              <a:rPr lang="en-US" sz="2000" dirty="0" smtClean="0">
+                <a:solidFill>
+                  <a:srgbClr val="2B91AF"/>
+                </a:solidFill>
+                <a:highlight>
+                  <a:srgbClr val="FFFFFF"/>
+                </a:highlight>
+                <a:latin typeface="Fira Code" panose="00000509000000000000" pitchFamily="49" charset="0"/>
+              </a:rPr>
+              <a:t>	Tuple</a:t>
+            </a:r>
+            <a:r>
+              <a:rPr lang="en-US" sz="2000" dirty="0" smtClean="0">
+                <a:solidFill>
+                  <a:srgbClr val="000000"/>
+                </a:solidFill>
+                <a:highlight>
+                  <a:srgbClr val="FFFFFF"/>
+                </a:highlight>
+                <a:latin typeface="Fira Code" panose="00000509000000000000" pitchFamily="49" charset="0"/>
+              </a:rPr>
+              <a:t>&lt;</a:t>
+            </a:r>
+            <a:r>
+              <a:rPr lang="en-US" sz="2000" dirty="0" err="1" smtClean="0">
+                <a:solidFill>
+                  <a:srgbClr val="0000FF"/>
+                </a:solidFill>
+                <a:highlight>
+                  <a:srgbClr val="FFFFFF"/>
+                </a:highlight>
+                <a:latin typeface="Fira Code" panose="00000509000000000000" pitchFamily="49" charset="0"/>
+              </a:rPr>
+              <a:t>int</a:t>
+            </a:r>
+            <a:r>
+              <a:rPr lang="en-US" sz="2000" dirty="0">
+                <a:solidFill>
+                  <a:srgbClr val="000000"/>
+                </a:solidFill>
+                <a:highlight>
+                  <a:srgbClr val="FFFFFF"/>
+                </a:highlight>
+                <a:latin typeface="Fira Code" panose="00000509000000000000" pitchFamily="49" charset="0"/>
+              </a:rPr>
+              <a:t>, </a:t>
+            </a:r>
+            <a:r>
+              <a:rPr lang="en-US" sz="2000" dirty="0">
+                <a:solidFill>
+                  <a:srgbClr val="0000FF"/>
+                </a:solidFill>
+                <a:highlight>
+                  <a:srgbClr val="FFFFFF"/>
+                </a:highlight>
+                <a:latin typeface="Fira Code" panose="00000509000000000000" pitchFamily="49" charset="0"/>
+              </a:rPr>
+              <a:t>string</a:t>
+            </a:r>
+            <a:r>
+              <a:rPr lang="en-US" sz="2000" dirty="0">
+                <a:solidFill>
+                  <a:srgbClr val="000000"/>
+                </a:solidFill>
+                <a:highlight>
+                  <a:srgbClr val="FFFFFF"/>
+                </a:highlight>
+                <a:latin typeface="Fira Code" panose="00000509000000000000" pitchFamily="49" charset="0"/>
+              </a:rPr>
+              <a:t>&gt;[] </a:t>
+            </a:r>
+            <a:r>
+              <a:rPr lang="en-US" sz="2000" dirty="0" err="1">
+                <a:solidFill>
+                  <a:srgbClr val="000000"/>
+                </a:solidFill>
+                <a:highlight>
+                  <a:srgbClr val="FFFFFF"/>
+                </a:highlight>
+                <a:latin typeface="Fira Code" panose="00000509000000000000" pitchFamily="49" charset="0"/>
+              </a:rPr>
+              <a:t>GetStatistics</a:t>
+            </a:r>
+            <a:r>
+              <a:rPr lang="en-US" sz="2000" dirty="0">
+                <a:solidFill>
+                  <a:srgbClr val="000000"/>
+                </a:solidFill>
+                <a:highlight>
+                  <a:srgbClr val="FFFFFF"/>
+                </a:highlight>
+                <a:latin typeface="Fira Code" panose="00000509000000000000" pitchFamily="49" charset="0"/>
+              </a:rPr>
+              <a:t>();</a:t>
+            </a:r>
+          </a:p>
+          <a:p>
+            <a:pPr marL="0" indent="0">
+              <a:buNone/>
+            </a:pPr>
+            <a:r>
+              <a:rPr lang="ru-RU" sz="2000" dirty="0" smtClean="0">
+                <a:solidFill>
+                  <a:srgbClr val="000000"/>
+                </a:solidFill>
+                <a:highlight>
+                  <a:srgbClr val="FFFFFF"/>
+                </a:highlight>
+                <a:latin typeface="Fira Code" panose="00000509000000000000" pitchFamily="49" charset="0"/>
+              </a:rPr>
+              <a:t>}</a:t>
+            </a:r>
+            <a:endParaRPr lang="en-US" sz="2000" dirty="0" smtClean="0">
+              <a:solidFill>
+                <a:srgbClr val="000000"/>
+              </a:solidFill>
+              <a:highlight>
+                <a:srgbClr val="FFFFFF"/>
+              </a:highlight>
+              <a:latin typeface="Fira Code" panose="00000509000000000000" pitchFamily="49" charset="0"/>
+            </a:endParaRPr>
+          </a:p>
+          <a:p>
+            <a:pPr marL="0" indent="0">
+              <a:buNone/>
+            </a:pPr>
+            <a:endParaRPr lang="en-US" sz="2000" dirty="0">
+              <a:solidFill>
+                <a:srgbClr val="000000"/>
+              </a:solidFill>
+              <a:highlight>
+                <a:srgbClr val="FFFFFF"/>
+              </a:highlight>
+              <a:latin typeface="Fira Code" panose="00000509000000000000" pitchFamily="49" charset="0"/>
+            </a:endParaRPr>
+          </a:p>
+          <a:p>
+            <a:r>
+              <a:rPr lang="ru-RU" sz="2800" dirty="0" smtClean="0">
+                <a:solidFill>
+                  <a:srgbClr val="000000"/>
+                </a:solidFill>
+                <a:highlight>
+                  <a:srgbClr val="FFFFFF"/>
+                </a:highlight>
+              </a:rPr>
+              <a:t>Частотный словарь по префиксу слова длины 10</a:t>
+            </a:r>
+          </a:p>
+          <a:p>
+            <a:r>
+              <a:rPr lang="ru-RU" sz="2800" dirty="0" smtClean="0">
+                <a:solidFill>
+                  <a:srgbClr val="000000"/>
+                </a:solidFill>
+                <a:highlight>
+                  <a:srgbClr val="FFFFFF"/>
+                </a:highlight>
+              </a:rPr>
+              <a:t>Без </a:t>
+            </a:r>
+            <a:r>
+              <a:rPr lang="ru-RU" sz="2800" dirty="0">
+                <a:solidFill>
+                  <a:srgbClr val="000000"/>
+                </a:solidFill>
+                <a:highlight>
+                  <a:srgbClr val="FFFFFF"/>
+                </a:highlight>
+              </a:rPr>
+              <a:t>учета </a:t>
+            </a:r>
+            <a:r>
+              <a:rPr lang="ru-RU" sz="2800" dirty="0" smtClean="0">
+                <a:solidFill>
+                  <a:srgbClr val="000000"/>
+                </a:solidFill>
+                <a:highlight>
+                  <a:srgbClr val="FFFFFF"/>
+                </a:highlight>
+              </a:rPr>
+              <a:t>регистра</a:t>
+            </a:r>
+          </a:p>
+          <a:p>
+            <a:r>
+              <a:rPr lang="ru-RU" sz="2800" dirty="0" smtClean="0">
+                <a:solidFill>
+                  <a:srgbClr val="000000"/>
+                </a:solidFill>
+                <a:highlight>
+                  <a:srgbClr val="FFFFFF"/>
+                </a:highlight>
+              </a:rPr>
+              <a:t>Без учета пустых слов и </a:t>
+            </a:r>
+            <a:r>
+              <a:rPr lang="en-US" sz="2800" dirty="0" smtClean="0">
+                <a:solidFill>
+                  <a:srgbClr val="000000"/>
+                </a:solidFill>
+                <a:highlight>
+                  <a:srgbClr val="FFFFFF"/>
+                </a:highlight>
+              </a:rPr>
+              <a:t>null-</a:t>
+            </a:r>
+            <a:r>
+              <a:rPr lang="ru-RU" sz="2800" dirty="0" err="1" smtClean="0">
+                <a:solidFill>
+                  <a:srgbClr val="000000"/>
+                </a:solidFill>
+                <a:highlight>
+                  <a:srgbClr val="FFFFFF"/>
+                </a:highlight>
+              </a:rPr>
+              <a:t>ов</a:t>
+            </a:r>
+            <a:endParaRPr lang="en-US" sz="2800" dirty="0" smtClean="0">
+              <a:solidFill>
+                <a:srgbClr val="000000"/>
+              </a:solidFill>
+              <a:highlight>
+                <a:srgbClr val="FFFFFF"/>
+              </a:highlight>
+            </a:endParaRPr>
+          </a:p>
+          <a:p>
+            <a:pPr marL="0" indent="0">
+              <a:buNone/>
+            </a:pPr>
+            <a:endParaRPr lang="ru-RU" sz="4400" dirty="0" smtClean="0">
+              <a:solidFill>
+                <a:srgbClr val="000000"/>
+              </a:solidFill>
+              <a:highlight>
+                <a:srgbClr val="FFFFFF"/>
+              </a:highlight>
+            </a:endParaRPr>
+          </a:p>
+          <a:p>
+            <a:pPr marL="0" indent="0">
+              <a:buNone/>
+            </a:pPr>
+            <a:r>
+              <a:rPr lang="ru-RU" sz="4400" dirty="0" smtClean="0">
+                <a:solidFill>
+                  <a:srgbClr val="000000"/>
+                </a:solidFill>
+                <a:highlight>
+                  <a:srgbClr val="FFFFFF"/>
+                </a:highlight>
+              </a:rPr>
+              <a:t>Какие нужны тесты?</a:t>
+            </a:r>
+            <a:endParaRPr lang="en-US" sz="4400" dirty="0">
+              <a:solidFill>
+                <a:srgbClr val="000000"/>
+              </a:solidFill>
+              <a:highlight>
+                <a:srgbClr val="FFFFFF"/>
+              </a:highlight>
+            </a:endParaRPr>
+          </a:p>
+        </p:txBody>
+      </p:sp>
+    </p:spTree>
+    <p:extLst>
+      <p:ext uri="{BB962C8B-B14F-4D97-AF65-F5344CB8AC3E}">
+        <p14:creationId xmlns:p14="http://schemas.microsoft.com/office/powerpoint/2010/main" val="3515574030"/>
+      </p:ext>
+    </p:extLst>
+  </p:cSld>
+  <p:clrMapOvr>
+    <a:masterClrMapping/>
+  </p:clrMapOvr>
+  <p:timing>
+    <p:tnLst>
+      <p:par>
+        <p:cTn id="1" dur="indefinite" restart="never" nodeType="tmRoot"/>
+      </p:par>
+    </p:tnLst>
+  </p:timing>
+</p:sld>
+</file>
+
+<file path=ppt/slides/slide4.xml><?xml version="1.0" encoding="utf-8"?>
+<p:sld xmlns:a="http://schemas.openxmlformats.org/drawingml/2006/main" xmlns:r="http://schemas.openxmlformats.org/officeDocument/2006/relationships" xmlns:p="http://schemas.openxmlformats.org/presentationml/2006/main">
+  <p:cSld>
+    <p:spTree>
+      <p:nvGrpSpPr>
+        <p:cNvPr id="1" name=""/>
+        <p:cNvGrpSpPr/>
+        <p:nvPr/>
+      </p:nvGrpSpPr>
+      <p:grpSpPr>
+        <a:xfrm>
+          <a:off x="0" y="0"/>
+          <a:ext cx="0" cy="0"/>
+          <a:chOff x="0" y="0"/>
+          <a:chExt cx="0" cy="0"/>
+        </a:xfrm>
+      </p:grpSpPr>
+      <p:sp>
+        <p:nvSpPr>
           <p:cNvPr id="5" name="Овал 4"/>
           <p:cNvSpPr/>
           <p:nvPr/>
@@ -10353,7 +10884,7 @@
 </p:sld>
 </file>
 
-<file path=ppt/slides/slide4.xml><?xml version="1.0" encoding="utf-8"?>
+<file path=ppt/slides/slide5.xml><?xml version="1.0" encoding="utf-8"?>
 <p:sld xmlns:a="http://schemas.openxmlformats.org/drawingml/2006/main" xmlns:r="http://schemas.openxmlformats.org/officeDocument/2006/relationships" xmlns:p="http://schemas.openxmlformats.org/presentationml/2006/main">
   <p:cSld>
     <p:spTree>
@@ -10432,7 +10963,7 @@
 </p:sld>
 </file>
 
-<file path=ppt/slides/slide5.xml><?xml version="1.0" encoding="utf-8"?>
+<file path=ppt/slides/slide6.xml><?xml version="1.0" encoding="utf-8"?>
 <p:sld xmlns:a="http://schemas.openxmlformats.org/drawingml/2006/main" xmlns:r="http://schemas.openxmlformats.org/officeDocument/2006/relationships" xmlns:p="http://schemas.openxmlformats.org/presentationml/2006/main">
   <p:cSld>
     <p:spTree>
@@ -10586,7 +11117,7 @@
 </p:sld>
 </file>
 
-<file path=ppt/slides/slide6.xml><?xml version="1.0" encoding="utf-8"?>
+<file path=ppt/slides/slide7.xml><?xml version="1.0" encoding="utf-8"?>
 <p:sld xmlns:a="http://schemas.openxmlformats.org/drawingml/2006/main" xmlns:r="http://schemas.openxmlformats.org/officeDocument/2006/relationships" xmlns:p="http://schemas.openxmlformats.org/presentationml/2006/main">
   <p:cSld>
     <p:spTree>
@@ -10963,184 +11494,6 @@
 </p:sld>
 </file>
 
-<file path=ppt/slides/slide7.xml><?xml version="1.0" encoding="utf-8"?>
-<p:sld xmlns:a="http://schemas.openxmlformats.org/drawingml/2006/main" xmlns:r="http://schemas.openxmlformats.org/officeDocument/2006/relationships" xmlns:p="http://schemas.openxmlformats.org/presentationml/2006/main">
-  <p:cSld>
-    <p:spTree>
-      <p:nvGrpSpPr>
-        <p:cNvPr id="1" name=""/>
-        <p:cNvGrpSpPr/>
-        <p:nvPr/>
-      </p:nvGrpSpPr>
-      <p:grpSpPr>
-        <a:xfrm>
-          <a:off x="0" y="0"/>
-          <a:ext cx="0" cy="0"/>
-          <a:chOff x="0" y="0"/>
-          <a:chExt cx="0" cy="0"/>
-        </a:xfrm>
-      </p:grpSpPr>
-      <p:sp>
-        <p:nvSpPr>
-          <p:cNvPr id="2" name="Заголовок 1"/>
-          <p:cNvSpPr>
-            <a:spLocks noGrp="1"/>
-          </p:cNvSpPr>
-          <p:nvPr>
-            <p:ph type="title"/>
-          </p:nvPr>
-        </p:nvSpPr>
-        <p:spPr/>
-        <p:txBody>
-          <a:bodyPr/>
-          <a:lstStyle/>
-          <a:p>
-            <a:r>
-              <a:rPr lang="ru-RU" dirty="0" smtClean="0"/>
-              <a:t>Задача (30 минут)</a:t>
-            </a:r>
-            <a:endParaRPr lang="ru-RU" dirty="0"/>
-          </a:p>
-        </p:txBody>
-      </p:sp>
-      <p:sp>
-        <p:nvSpPr>
-          <p:cNvPr id="3" name="Объект 2"/>
-          <p:cNvSpPr>
-            <a:spLocks noGrp="1"/>
-          </p:cNvSpPr>
-          <p:nvPr>
-            <p:ph idx="1"/>
-          </p:nvPr>
-        </p:nvSpPr>
-        <p:spPr/>
-        <p:txBody>
-          <a:bodyPr/>
-          <a:lstStyle/>
-          <a:p>
-            <a:pPr marL="0" indent="0">
-              <a:buNone/>
-            </a:pPr>
-            <a:r>
-              <a:rPr lang="en-US" dirty="0" err="1" smtClean="0"/>
-              <a:t>CleanCode</a:t>
-            </a:r>
-            <a:r>
-              <a:rPr lang="en-US" dirty="0" smtClean="0"/>
-              <a:t>/</a:t>
-            </a:r>
-            <a:r>
-              <a:rPr lang="en-US" dirty="0" err="1" smtClean="0"/>
-              <a:t>Chess.cs</a:t>
-            </a:r>
-            <a:endParaRPr lang="en-US" dirty="0" smtClean="0"/>
-          </a:p>
-          <a:p>
-            <a:pPr marL="0" indent="0">
-              <a:buNone/>
-            </a:pPr>
-            <a:endParaRPr lang="en-US" dirty="0"/>
-          </a:p>
-          <a:p>
-            <a:pPr marL="0" indent="0">
-              <a:buNone/>
-            </a:pPr>
-            <a:r>
-              <a:rPr lang="ru-RU" dirty="0"/>
-              <a:t>F2 / </a:t>
-            </a:r>
-            <a:r>
-              <a:rPr lang="ru-RU" dirty="0" err="1"/>
-              <a:t>Ctrl+R+R</a:t>
-            </a:r>
-            <a:r>
-              <a:rPr lang="ru-RU" dirty="0"/>
-              <a:t> </a:t>
-            </a:r>
-            <a:r>
-              <a:rPr lang="en-US" dirty="0" smtClean="0"/>
-              <a:t> — </a:t>
-            </a:r>
-            <a:r>
-              <a:rPr lang="ru-RU" dirty="0" smtClean="0"/>
-              <a:t>переименовать</a:t>
-            </a:r>
-            <a:endParaRPr lang="ru-RU" dirty="0"/>
-          </a:p>
-          <a:p>
-            <a:pPr marL="0" indent="0">
-              <a:buNone/>
-            </a:pPr>
-            <a:r>
-              <a:rPr lang="ru-RU" dirty="0" err="1"/>
-              <a:t>Ctrl+Alt+M</a:t>
-            </a:r>
-            <a:r>
-              <a:rPr lang="ru-RU" dirty="0"/>
-              <a:t> / </a:t>
-            </a:r>
-            <a:r>
-              <a:rPr lang="ru-RU" dirty="0" err="1"/>
-              <a:t>Ctrl+R+M</a:t>
-            </a:r>
-            <a:r>
-              <a:rPr lang="ru-RU" dirty="0"/>
-              <a:t> </a:t>
-            </a:r>
-            <a:r>
-              <a:rPr lang="ru-RU" dirty="0" smtClean="0"/>
-              <a:t> — выделить метод</a:t>
-            </a:r>
-            <a:endParaRPr lang="ru-RU" dirty="0"/>
-          </a:p>
-          <a:p>
-            <a:pPr marL="0" indent="0">
-              <a:buNone/>
-            </a:pPr>
-            <a:r>
-              <a:rPr lang="ru-RU" dirty="0" err="1"/>
-              <a:t>Ctrl+Alt+V</a:t>
-            </a:r>
-            <a:r>
-              <a:rPr lang="ru-RU" dirty="0"/>
-              <a:t> / </a:t>
-            </a:r>
-            <a:r>
-              <a:rPr lang="ru-RU" dirty="0" err="1"/>
-              <a:t>Ctrl+R+V</a:t>
-            </a:r>
-            <a:r>
-              <a:rPr lang="ru-RU" dirty="0"/>
-              <a:t> </a:t>
-            </a:r>
-            <a:r>
-              <a:rPr lang="ru-RU" dirty="0" smtClean="0"/>
-              <a:t>— выделить переменную</a:t>
-            </a:r>
-            <a:endParaRPr lang="ru-RU" dirty="0"/>
-          </a:p>
-        </p:txBody>
-      </p:sp>
-    </p:spTree>
-    <p:extLst>
-      <p:ext uri="{BB962C8B-B14F-4D97-AF65-F5344CB8AC3E}">
-        <p14:creationId xmlns:p14="http://schemas.microsoft.com/office/powerpoint/2010/main" val="1568486213"/>
-      </p:ext>
-    </p:extLst>
-  </p:cSld>
-  <p:clrMapOvr>
-    <a:masterClrMapping/>
-  </p:clrMapOvr>
-  <p:timing>
-    <p:tnLst>
-      <p:par>
-        <p:cTn id="1" dur="indefinite" restart="never" nodeType="tmRoot"/>
-      </p:par>
-    </p:tnLst>
-  </p:timing>
-</p:sld>
-</file>
-
 <file path=ppt/slides/slide8.xml><?xml version="1.0" encoding="utf-8"?>
 <p:sld xmlns:a="http://schemas.openxmlformats.org/drawingml/2006/main" xmlns:r="http://schemas.openxmlformats.org/officeDocument/2006/relationships" xmlns:p="http://schemas.openxmlformats.org/presentationml/2006/main">
   <p:cSld>
@@ -11160,7 +11513,7 @@
       </p:grpSpPr>
       <p:sp>
         <p:nvSpPr>
-          <p:cNvPr id="4" name="Заголовок 3"/>
+          <p:cNvPr id="2" name="Заголовок 1"/>
           <p:cNvSpPr>
             <a:spLocks noGrp="1"/>
           </p:cNvSpPr>
@@ -11175,7 +11528,7 @@
           <a:p>
             <a:r>
               <a:rPr lang="ru-RU" dirty="0" smtClean="0"/>
-              <a:t>Тестирование</a:t>
+              <a:t>Задача (30 минут)</a:t>
             </a:r>
             <a:endParaRPr lang="ru-RU" dirty="0"/>
           </a:p>
@@ -11183,12 +11536,12 @@
       </p:sp>
       <p:sp>
         <p:nvSpPr>
-          <p:cNvPr id="5" name="Текст 4"/>
+          <p:cNvPr id="3" name="Объект 2"/>
           <p:cNvSpPr>
             <a:spLocks noGrp="1"/>
           </p:cNvSpPr>
           <p:nvPr>
-            <p:ph type="body" idx="1"/>
+            <p:ph idx="1"/>
           </p:nvPr>
         </p:nvSpPr>
         <p:spPr/>
@@ -11196,14 +11549,113 @@
           <a:bodyPr/>
           <a:lstStyle/>
           <a:p>
-            <a:endParaRPr lang="ru-RU"/>
+            <a:pPr marL="0" indent="0">
+              <a:buNone/>
+            </a:pPr>
+            <a:r>
+              <a:rPr lang="en-US" dirty="0" err="1" smtClean="0"/>
+              <a:t>CleanCode</a:t>
+            </a:r>
+            <a:r>
+              <a:rPr lang="en-US" dirty="0" smtClean="0"/>
+              <a:t>/</a:t>
+            </a:r>
+            <a:r>
+              <a:rPr lang="en-US" dirty="0" err="1" smtClean="0"/>
+              <a:t>Chess.cs</a:t>
+            </a:r>
+            <a:endParaRPr lang="en-US" dirty="0" smtClean="0"/>
+          </a:p>
+          <a:p>
+            <a:pPr marL="0" indent="0">
+              <a:buNone/>
+            </a:pPr>
+            <a:endParaRPr lang="en-US" dirty="0"/>
+          </a:p>
+          <a:p>
+            <a:pPr marL="0" indent="0">
+              <a:buNone/>
+            </a:pPr>
+            <a:r>
+              <a:rPr lang="ru-RU" dirty="0"/>
+              <a:t>F2 / </a:t>
+            </a:r>
+            <a:r>
+              <a:rPr lang="ru-RU" dirty="0" err="1"/>
+              <a:t>Ctrl+R+R</a:t>
+            </a:r>
+            <a:r>
+              <a:rPr lang="ru-RU" dirty="0"/>
+              <a:t> </a:t>
+            </a:r>
+            <a:r>
+              <a:rPr lang="en-US" dirty="0" smtClean="0"/>
+              <a:t> — </a:t>
+            </a:r>
+            <a:r>
+              <a:rPr lang="ru-RU" dirty="0" smtClean="0"/>
+              <a:t>переименовать</a:t>
+            </a:r>
+            <a:endParaRPr lang="ru-RU" dirty="0"/>
+          </a:p>
+          <a:p>
+            <a:pPr marL="0" indent="0">
+              <a:buNone/>
+            </a:pPr>
+            <a:r>
+              <a:rPr lang="ru-RU" dirty="0" err="1"/>
+              <a:t>Ctrl+Alt+M</a:t>
+            </a:r>
+            <a:r>
+              <a:rPr lang="ru-RU" dirty="0"/>
+              <a:t> / </a:t>
+            </a:r>
+            <a:r>
+              <a:rPr lang="ru-RU" dirty="0" err="1"/>
+              <a:t>Ctrl+R+M</a:t>
+            </a:r>
+            <a:r>
+              <a:rPr lang="ru-RU" dirty="0"/>
+              <a:t> </a:t>
+            </a:r>
+            <a:r>
+              <a:rPr lang="ru-RU" dirty="0" smtClean="0"/>
+              <a:t> — выделить метод</a:t>
+            </a:r>
+            <a:endParaRPr lang="ru-RU" dirty="0"/>
+          </a:p>
+          <a:p>
+            <a:pPr marL="0" indent="0">
+              <a:buNone/>
+            </a:pPr>
+            <a:r>
+              <a:rPr lang="ru-RU" dirty="0" err="1"/>
+              <a:t>Ctrl+Alt+V</a:t>
+            </a:r>
+            <a:r>
+              <a:rPr lang="ru-RU" dirty="0"/>
+              <a:t> / </a:t>
+            </a:r>
+            <a:r>
+              <a:rPr lang="ru-RU" dirty="0" err="1"/>
+              <a:t>Ctrl+R+V</a:t>
+            </a:r>
+            <a:r>
+              <a:rPr lang="ru-RU" dirty="0"/>
+              <a:t> </a:t>
+            </a:r>
+            <a:r>
+              <a:rPr lang="ru-RU" dirty="0" smtClean="0"/>
+              <a:t>— выделить переменную</a:t>
+            </a:r>
+            <a:endParaRPr lang="ru-RU" dirty="0"/>
           </a:p>
         </p:txBody>
       </p:sp>
     </p:spTree>
     <p:extLst>
       <p:ext uri="{BB962C8B-B14F-4D97-AF65-F5344CB8AC3E}">
-        <p14:creationId xmlns:p14="http://schemas.microsoft.com/office/powerpoint/2010/main" val="2632731554"/>
+        <p14:creationId xmlns:p14="http://schemas.microsoft.com/office/powerpoint/2010/main" val="1568486213"/>
       </p:ext>
     </p:extLst>
   </p:cSld>
@@ -11239,7 +11691,7 @@
       </p:grpSpPr>
       <p:sp>
         <p:nvSpPr>
-          <p:cNvPr id="2" name="Заголовок 1"/>
+          <p:cNvPr id="4" name="Заголовок 3"/>
           <p:cNvSpPr>
             <a:spLocks noGrp="1"/>
           </p:cNvSpPr>
@@ -11253,12 +11705,8 @@
           <a:lstStyle/>
           <a:p>
             <a:r>
-              <a:rPr lang="ru-RU" dirty="0" err="1" smtClean="0"/>
-              <a:t>Антипаттерн</a:t>
-            </a:r>
-            <a:r>
-              <a:rPr lang="ru-RU" dirty="0" err="1"/>
-              <a:t>ы</a:t>
+              <a:rPr lang="ru-RU" dirty="0" smtClean="0"/>
+              <a:t>Тестирование</a:t>
             </a:r>
             <a:endParaRPr lang="ru-RU" dirty="0"/>
           </a:p>
@@ -11266,12 +11714,12 @@
       </p:sp>
       <p:sp>
         <p:nvSpPr>
-          <p:cNvPr id="3" name="Объект 2"/>
+          <p:cNvPr id="5" name="Текст 4"/>
           <p:cNvSpPr>
             <a:spLocks noGrp="1"/>
           </p:cNvSpPr>
           <p:nvPr>
-            <p:ph idx="1"/>
+            <p:ph type="body" idx="1"/>
           </p:nvPr>
         </p:nvSpPr>
         <p:spPr/>
@@ -11279,71 +11727,14 @@
           <a:bodyPr/>
           <a:lstStyle/>
           <a:p>
-            <a:r>
-              <a:rPr lang="en-US" dirty="0" smtClean="0"/>
-              <a:t>Local Hero</a:t>
-            </a:r>
-            <a:endParaRPr lang="ru-RU" dirty="0" smtClean="0"/>
-          </a:p>
-          <a:p>
-            <a:r>
-              <a:rPr lang="en-US" dirty="0" smtClean="0"/>
-              <a:t>Loudmouth</a:t>
-            </a:r>
-            <a:endParaRPr lang="ru-RU" dirty="0"/>
-          </a:p>
-          <a:p>
-            <a:r>
-              <a:rPr lang="en-US" dirty="0" smtClean="0"/>
-              <a:t>Free Ride</a:t>
-            </a:r>
-            <a:endParaRPr lang="ru-RU" dirty="0" smtClean="0"/>
-          </a:p>
-          <a:p>
-            <a:r>
-              <a:rPr lang="en-US" dirty="0" smtClean="0"/>
-              <a:t>Over</a:t>
-            </a:r>
-            <a:r>
-              <a:rPr lang="ru-RU" dirty="0" smtClean="0"/>
-              <a:t> </a:t>
-            </a:r>
-            <a:r>
-              <a:rPr lang="en-US" dirty="0" smtClean="0"/>
-              <a:t>specification</a:t>
-            </a:r>
-          </a:p>
-          <a:p>
-            <a:endParaRPr lang="en-US" dirty="0"/>
-          </a:p>
-          <a:p>
-            <a:pPr marL="0" indent="0">
-              <a:buNone/>
-            </a:pPr>
-            <a:r>
-              <a:rPr lang="en-US" sz="2400" dirty="0">
-                <a:hlinkClick r:id="rId2"/>
-              </a:rPr>
-              <a:t>http://blog.james-carr.org/2006/11/03/tdd-anti-patterns</a:t>
-            </a:r>
-            <a:r>
-              <a:rPr lang="en-US" sz="2400" dirty="0" smtClean="0">
-                <a:hlinkClick r:id="rId2"/>
-              </a:rPr>
-              <a:t>/</a:t>
-            </a:r>
-            <a:r>
-              <a:rPr lang="en-US" sz="2400" dirty="0" smtClean="0"/>
-              <a:t> </a:t>
-            </a:r>
-            <a:endParaRPr lang="ru-RU" sz="2400" dirty="0"/>
+            <a:endParaRPr lang="ru-RU"/>
           </a:p>
         </p:txBody>
       </p:sp>
     </p:spTree>
     <p:extLst>
       <p:ext uri="{BB962C8B-B14F-4D97-AF65-F5344CB8AC3E}">
-        <p14:creationId xmlns:p14="http://schemas.microsoft.com/office/powerpoint/2010/main" val="4191729357"/>
+        <p14:creationId xmlns:p14="http://schemas.microsoft.com/office/powerpoint/2010/main" val="2632731554"/>
       </p:ext>
     </p:extLst>
   </p:cSld>
@@ -11353,280 +11744,9 @@
   <p:timing>
     <p:tnLst>
       <p:par>
-        <p:cTn id="1" dur="indefinite" restart="never" nodeType="tmRoot">
-          <p:childTnLst>
-            <p:seq concurrent="1" nextAc="seek">
-              <p:cTn id="2" dur="indefinite" nodeType="mainSeq">
-                <p:childTnLst>
-                  <p:par>
-                    <p:cTn id="3" fill="hold">
-                      <p:stCondLst>
-                        <p:cond delay="indefinite"/>
-                      </p:stCondLst>
-                      <p:childTnLst>
-                        <p:par>
-                          <p:cTn id="4" fill="hold">
-                            <p:stCondLst>
-                              <p:cond delay="0"/>
-                            </p:stCondLst>
-                            <p:childTnLst>
-                              <p:par>
-                                <p:cTn id="5" presetID="1" presetClass="entr" presetSubtype="0" fill="hold" grpId="0" nodeType="clickEffect">
-                                  <p:stCondLst>
-                                    <p:cond delay="0"/>
-                                  </p:stCondLst>
-                                  <p:childTnLst>
-                                    <p:set>
-                                      <p:cBhvr>
-                                        <p:cTn id="6" dur="1" fill="hold">
-                                          <p:stCondLst>
-                                            <p:cond delay="0"/>
-                                          </p:stCondLst>
-                                        </p:cTn>
-                                        <p:tgtEl>
-                                          <p:spTgt spid="3">
-                                            <p:txEl>
-                                              <p:pRg st="0" end="0"/>
-                                            </p:txEl>
-                                          </p:spTgt>
-                                        </p:tgtEl>
-                                        <p:attrNameLst>
-                                          <p:attrName>style.visibility</p:attrName>
-                                        </p:attrNameLst>
-                                      </p:cBhvr>
-                                      <p:to>
-                                        <p:strVal val="visible"/>
-                                      </p:to>
-                                    </p:set>
-                                  </p:childTnLst>
-                                </p:cTn>
-                              </p:par>
-                            </p:childTnLst>
-                          </p:cTn>
-                        </p:par>
-                      </p:childTnLst>
-                    </p:cTn>
-                  </p:par>
-                  <p:par>
-                    <p:cTn id="7" fill="hold">
-                      <p:stCondLst>
-                        <p:cond delay="indefinite"/>
-                      </p:stCondLst>
-                      <p:childTnLst>
-                        <p:par>
-                          <p:cTn id="8" fill="hold">
-                            <p:stCondLst>
-                              <p:cond delay="0"/>
-                            </p:stCondLst>
-                            <p:childTnLst>
-                              <p:par>
-                                <p:cTn id="9" presetID="1" presetClass="entr" presetSubtype="0" fill="hold" grpId="0" nodeType="clickEffect">
-                                  <p:stCondLst>
-                                    <p:cond delay="0"/>
-                                  </p:stCondLst>
-                                  <p:childTnLst>
-                                    <p:set>
-                                      <p:cBhvr>
-                                        <p:cTn id="10" dur="1" fill="hold">
-                                          <p:stCondLst>
-                                            <p:cond delay="0"/>
-                                          </p:stCondLst>
-                                        </p:cTn>
-                                        <p:tgtEl>
-                                          <p:spTgt spid="3">
-                                            <p:txEl>
-                                              <p:pRg st="1" end="1"/>
-                                            </p:txEl>
-                                          </p:spTgt>
-                                        </p:tgtEl>
-                                        <p:attrNameLst>
-                                          <p:attrName>style.visibility</p:attrName>
-                                        </p:attrNameLst>
-                                      </p:cBhvr>
-                                      <p:to>
-                                        <p:strVal val="visible"/>
-                                      </p:to>
-                                    </p:set>
-                                  </p:childTnLst>
-                                </p:cTn>
-                              </p:par>
-                            </p:childTnLst>
-                          </p:cTn>
-                        </p:par>
-                      </p:childTnLst>
-                    </p:cTn>
-                  </p:par>
-                  <p:par>
-                    <p:cTn id="11" fill="hold">
-                      <p:stCondLst>
-                        <p:cond delay="indefinite"/>
-                      </p:stCondLst>
-                      <p:childTnLst>
-                        <p:par>
-                          <p:cTn id="12" fill="hold">
-                            <p:stCondLst>
-                              <p:cond delay="0"/>
-                            </p:stCondLst>
-                            <p:childTnLst>
-                              <p:par>
-                                <p:cTn id="13" presetID="1" presetClass="entr" presetSubtype="0" fill="hold" grpId="0" nodeType="clickEffect">
-                                  <p:stCondLst>
-                                    <p:cond delay="0"/>
-                                  </p:stCondLst>
-                                  <p:childTnLst>
-                                    <p:set>
-                                      <p:cBhvr>
-                                        <p:cTn id="14" dur="1" fill="hold">
-                                          <p:stCondLst>
-                                            <p:cond delay="0"/>
-                                          </p:stCondLst>
-                                        </p:cTn>
-                                        <p:tgtEl>
-                                          <p:spTgt spid="3">
-                                            <p:txEl>
-                                              <p:pRg st="2" end="2"/>
-                                            </p:txEl>
-                                          </p:spTgt>
-                                        </p:tgtEl>
-                                        <p:attrNameLst>
-                                          <p:attrName>style.visibility</p:attrName>
-                                        </p:attrNameLst>
-                                      </p:cBhvr>
-                                      <p:to>
-                                        <p:strVal val="visible"/>
-                                      </p:to>
-                                    </p:set>
-                                  </p:childTnLst>
-                                </p:cTn>
-                              </p:par>
-                            </p:childTnLst>
-                          </p:cTn>
-                        </p:par>
-                      </p:childTnLst>
-                    </p:cTn>
-                  </p:par>
-                  <p:par>
-                    <p:cTn id="15" fill="hold">
-                      <p:stCondLst>
-                        <p:cond delay="indefinite"/>
-                      </p:stCondLst>
-                      <p:childTnLst>
-                        <p:par>
-                          <p:cTn id="16" fill="hold">
-                            <p:stCondLst>
-                              <p:cond delay="0"/>
-                            </p:stCondLst>
-                            <p:childTnLst>
-                              <p:par>
-                                <p:cTn id="17" presetID="1" presetClass="entr" presetSubtype="0" fill="hold" grpId="0" nodeType="clickEffect">
-                                  <p:stCondLst>
-                                    <p:cond delay="0"/>
-                                  </p:stCondLst>
-                                  <p:childTnLst>
-                                    <p:set>
-                                      <p:cBhvr>
-                                        <p:cTn id="18" dur="1" fill="hold">
-                                          <p:stCondLst>
-                                            <p:cond delay="0"/>
-                                          </p:stCondLst>
-                                        </p:cTn>
-                                        <p:tgtEl>
-                                          <p:spTgt spid="3">
-                                            <p:txEl>
-                                              <p:pRg st="3" end="3"/>
-                                            </p:txEl>
-                                          </p:spTgt>
-                                        </p:tgtEl>
-                                        <p:attrNameLst>
-                                          <p:attrName>style.visibility</p:attrName>
-                                        </p:attrNameLst>
-                                      </p:cBhvr>
-                                      <p:to>
-                                        <p:strVal val="visible"/>
-                                      </p:to>
-                                    </p:set>
-                                  </p:childTnLst>
-                                </p:cTn>
-                              </p:par>
-                            </p:childTnLst>
-                          </p:cTn>
-                        </p:par>
-                      </p:childTnLst>
-                    </p:cTn>
-                  </p:par>
-                  <p:par>
-                    <p:cTn id="19" fill="hold">
-                      <p:stCondLst>
-                        <p:cond delay="indefinite"/>
-                      </p:stCondLst>
-                      <p:childTnLst>
-                        <p:par>
-                          <p:cTn id="20" fill="hold">
-                            <p:stCondLst>
-                              <p:cond delay="0"/>
-                            </p:stCondLst>
-                            <p:childTnLst>
-                              <p:par>
-                                <p:cTn id="21" presetID="1" presetClass="entr" presetSubtype="0" fill="hold" grpId="0" nodeType="clickEffect">
-                                  <p:stCondLst>
-                                    <p:cond delay="0"/>
-                                  </p:stCondLst>
-                                  <p:childTnLst>
-                                    <p:set>
-                                      <p:cBhvr>
-                                        <p:cTn id="22" dur="1" fill="hold">
-                                          <p:stCondLst>
-                                            <p:cond delay="0"/>
-                                          </p:stCondLst>
-                                        </p:cTn>
-                                        <p:tgtEl>
-                                          <p:spTgt spid="3">
-                                            <p:txEl>
-                                              <p:pRg st="5" end="5"/>
-                                            </p:txEl>
-                                          </p:spTgt>
-                                        </p:tgtEl>
-                                        <p:attrNameLst>
-                                          <p:attrName>style.visibility</p:attrName>
-                                        </p:attrNameLst>
-                                      </p:cBhvr>
-                                      <p:to>
-                                        <p:strVal val="visible"/>
-                                      </p:to>
-                                    </p:set>
-                                  </p:childTnLst>
-                                </p:cTn>
-                              </p:par>
-                            </p:childTnLst>
-                          </p:cTn>
-                        </p:par>
-                      </p:childTnLst>
-                    </p:cTn>
-                  </p:par>
-                </p:childTnLst>
-              </p:cTn>
-              <p:prevCondLst>
-                <p:cond evt="onPrev" delay="0">
-                  <p:tgtEl>
-                    <p:sldTgt/>
-                  </p:tgtEl>
-                </p:cond>
-              </p:prevCondLst>
-              <p:nextCondLst>
-                <p:cond evt="onNext" delay="0">
-                  <p:tgtEl>
-                    <p:sldTgt/>
-                  </p:tgtEl>
-                </p:cond>
-              </p:nextCondLst>
-            </p:seq>
-          </p:childTnLst>
-        </p:cTn>
+        <p:cTn id="1" dur="indefinite" restart="never" nodeType="tmRoot"/>
       </p:par>
     </p:tnLst>
-    <p:bldLst>
-      <p:bldP spid="3" grpId="0" build="p"/>
-    </p:bldLst>
   </p:timing>
 </p:sld>
 </file>

</xml_diff>